<commit_message>
Update Assignment #5 Oral Presentation.pptx
</commit_message>
<xml_diff>
--- a/Advanced Technical Writing/WEEK 10/Assignment #5 Oral Presentation.pptx
+++ b/Advanced Technical Writing/WEEK 10/Assignment #5 Oral Presentation.pptx
@@ -5,22 +5,24 @@
     <p:sldMasterId id="2147483660" r:id="rId1"/>
   </p:sldMasterIdLst>
   <p:notesMasterIdLst>
-    <p:notesMasterId r:id="rId15"/>
+    <p:notesMasterId r:id="rId17"/>
   </p:notesMasterIdLst>
   <p:sldIdLst>
     <p:sldId id="256" r:id="rId2"/>
     <p:sldId id="266" r:id="rId3"/>
-    <p:sldId id="267" r:id="rId4"/>
-    <p:sldId id="257" r:id="rId5"/>
-    <p:sldId id="263" r:id="rId6"/>
-    <p:sldId id="258" r:id="rId7"/>
-    <p:sldId id="268" r:id="rId8"/>
-    <p:sldId id="259" r:id="rId9"/>
-    <p:sldId id="264" r:id="rId10"/>
-    <p:sldId id="260" r:id="rId11"/>
-    <p:sldId id="261" r:id="rId12"/>
-    <p:sldId id="265" r:id="rId13"/>
-    <p:sldId id="262" r:id="rId14"/>
+    <p:sldId id="269" r:id="rId4"/>
+    <p:sldId id="270" r:id="rId5"/>
+    <p:sldId id="267" r:id="rId6"/>
+    <p:sldId id="257" r:id="rId7"/>
+    <p:sldId id="263" r:id="rId8"/>
+    <p:sldId id="258" r:id="rId9"/>
+    <p:sldId id="268" r:id="rId10"/>
+    <p:sldId id="259" r:id="rId11"/>
+    <p:sldId id="264" r:id="rId12"/>
+    <p:sldId id="260" r:id="rId13"/>
+    <p:sldId id="261" r:id="rId14"/>
+    <p:sldId id="265" r:id="rId15"/>
+    <p:sldId id="262" r:id="rId16"/>
   </p:sldIdLst>
   <p:sldSz cx="12192000" cy="6858000"/>
   <p:notesSz cx="6858000" cy="9144000"/>
@@ -6142,7 +6144,7 @@
           <a:p>
             <a:fld id="{1E08D278-AA25-4D1C-AD97-3CF5BD930730}" type="datetimeFigureOut">
               <a:rPr lang="en-US" smtClean="0"/>
-              <a:t>5/31/2021</a:t>
+              <a:t>6/1/2021</a:t>
             </a:fld>
             <a:endParaRPr lang="en-US"/>
           </a:p>
@@ -6474,7 +6476,7 @@
           <a:p>
             <a:fld id="{8F2F61B9-9785-4F17-9DD4-FCC6B3671EFB}" type="slidenum">
               <a:rPr lang="en-US" smtClean="0"/>
-              <a:t>5</a:t>
+              <a:t>7</a:t>
             </a:fld>
             <a:endParaRPr lang="en-US"/>
           </a:p>
@@ -6558,7 +6560,7 @@
           <a:p>
             <a:fld id="{8F2F61B9-9785-4F17-9DD4-FCC6B3671EFB}" type="slidenum">
               <a:rPr lang="en-US" smtClean="0"/>
-              <a:t>10</a:t>
+              <a:t>12</a:t>
             </a:fld>
             <a:endParaRPr lang="en-US"/>
           </a:p>
@@ -6568,6 +6570,90 @@
     <p:extLst>
       <p:ext uri="{BB962C8B-B14F-4D97-AF65-F5344CB8AC3E}">
         <p14:creationId xmlns:p14="http://schemas.microsoft.com/office/powerpoint/2010/main" val="30017755"/>
+      </p:ext>
+    </p:extLst>
+  </p:cSld>
+  <p:clrMapOvr>
+    <a:masterClrMapping/>
+  </p:clrMapOvr>
+</p:notes>
+</file>
+
+<file path=ppt/notesSlides/notesSlide3.xml><?xml version="1.0" encoding="utf-8"?>
+<p:notes xmlns:a="http://schemas.openxmlformats.org/drawingml/2006/main" xmlns:r="http://schemas.openxmlformats.org/officeDocument/2006/relationships" xmlns:p="http://schemas.openxmlformats.org/presentationml/2006/main">
+  <p:cSld>
+    <p:spTree>
+      <p:nvGrpSpPr>
+        <p:cNvPr id="1" name=""/>
+        <p:cNvGrpSpPr/>
+        <p:nvPr/>
+      </p:nvGrpSpPr>
+      <p:grpSpPr>
+        <a:xfrm>
+          <a:off x="0" y="0"/>
+          <a:ext cx="0" cy="0"/>
+          <a:chOff x="0" y="0"/>
+          <a:chExt cx="0" cy="0"/>
+        </a:xfrm>
+      </p:grpSpPr>
+      <p:sp>
+        <p:nvSpPr>
+          <p:cNvPr id="2" name="Slide Image Placeholder 1"/>
+          <p:cNvSpPr>
+            <a:spLocks noGrp="1" noRot="1" noChangeAspect="1"/>
+          </p:cNvSpPr>
+          <p:nvPr>
+            <p:ph type="sldImg"/>
+          </p:nvPr>
+        </p:nvSpPr>
+        <p:spPr/>
+      </p:sp>
+      <p:sp>
+        <p:nvSpPr>
+          <p:cNvPr id="3" name="Notes Placeholder 2"/>
+          <p:cNvSpPr>
+            <a:spLocks noGrp="1"/>
+          </p:cNvSpPr>
+          <p:nvPr>
+            <p:ph type="body" idx="1"/>
+          </p:nvPr>
+        </p:nvSpPr>
+        <p:spPr/>
+        <p:txBody>
+          <a:bodyPr/>
+          <a:lstStyle/>
+          <a:p>
+            <a:endParaRPr lang="en-US" dirty="0"/>
+          </a:p>
+        </p:txBody>
+      </p:sp>
+      <p:sp>
+        <p:nvSpPr>
+          <p:cNvPr id="4" name="Slide Number Placeholder 3"/>
+          <p:cNvSpPr>
+            <a:spLocks noGrp="1"/>
+          </p:cNvSpPr>
+          <p:nvPr>
+            <p:ph type="sldNum" sz="quarter" idx="5"/>
+          </p:nvPr>
+        </p:nvSpPr>
+        <p:spPr/>
+        <p:txBody>
+          <a:bodyPr/>
+          <a:lstStyle/>
+          <a:p>
+            <a:fld id="{8F2F61B9-9785-4F17-9DD4-FCC6B3671EFB}" type="slidenum">
+              <a:rPr lang="en-US" smtClean="0"/>
+              <a:t>13</a:t>
+            </a:fld>
+            <a:endParaRPr lang="en-US"/>
+          </a:p>
+        </p:txBody>
+      </p:sp>
+    </p:spTree>
+    <p:extLst>
+      <p:ext uri="{BB962C8B-B14F-4D97-AF65-F5344CB8AC3E}">
+        <p14:creationId xmlns:p14="http://schemas.microsoft.com/office/powerpoint/2010/main" val="3019096576"/>
       </p:ext>
     </p:extLst>
   </p:cSld>
@@ -6746,7 +6832,7 @@
           <a:p>
             <a:fld id="{B2561D94-212F-457B-AFB3-2A43FAF60559}" type="datetimeFigureOut">
               <a:rPr lang="en-US" smtClean="0"/>
-              <a:t>5/31/2021</a:t>
+              <a:t>6/1/2021</a:t>
             </a:fld>
             <a:endParaRPr lang="en-US"/>
           </a:p>
@@ -7076,7 +7162,7 @@
           <a:p>
             <a:fld id="{B2561D94-212F-457B-AFB3-2A43FAF60559}" type="datetimeFigureOut">
               <a:rPr lang="en-US" smtClean="0"/>
-              <a:t>5/31/2021</a:t>
+              <a:t>6/1/2021</a:t>
             </a:fld>
             <a:endParaRPr lang="en-US"/>
           </a:p>
@@ -7256,7 +7342,7 @@
           <a:p>
             <a:fld id="{B2561D94-212F-457B-AFB3-2A43FAF60559}" type="datetimeFigureOut">
               <a:rPr lang="en-US" smtClean="0"/>
-              <a:t>5/31/2021</a:t>
+              <a:t>6/1/2021</a:t>
             </a:fld>
             <a:endParaRPr lang="en-US"/>
           </a:p>
@@ -7426,7 +7512,7 @@
           <a:p>
             <a:fld id="{B2561D94-212F-457B-AFB3-2A43FAF60559}" type="datetimeFigureOut">
               <a:rPr lang="en-US" smtClean="0"/>
-              <a:t>5/31/2021</a:t>
+              <a:t>6/1/2021</a:t>
             </a:fld>
             <a:endParaRPr lang="en-US"/>
           </a:p>
@@ -7703,7 +7789,7 @@
           <a:p>
             <a:fld id="{B2561D94-212F-457B-AFB3-2A43FAF60559}" type="datetimeFigureOut">
               <a:rPr lang="en-US" smtClean="0"/>
-              <a:t>5/31/2021</a:t>
+              <a:t>6/1/2021</a:t>
             </a:fld>
             <a:endParaRPr lang="en-US"/>
           </a:p>
@@ -8097,7 +8183,7 @@
           <a:p>
             <a:fld id="{B2561D94-212F-457B-AFB3-2A43FAF60559}" type="datetimeFigureOut">
               <a:rPr lang="en-US" smtClean="0"/>
-              <a:t>5/31/2021</a:t>
+              <a:t>6/1/2021</a:t>
             </a:fld>
             <a:endParaRPr lang="en-US"/>
           </a:p>
@@ -8574,7 +8660,7 @@
           <a:p>
             <a:fld id="{B2561D94-212F-457B-AFB3-2A43FAF60559}" type="datetimeFigureOut">
               <a:rPr lang="en-US" smtClean="0"/>
-              <a:t>5/31/2021</a:t>
+              <a:t>6/1/2021</a:t>
             </a:fld>
             <a:endParaRPr lang="en-US"/>
           </a:p>
@@ -8692,7 +8778,7 @@
           <a:p>
             <a:fld id="{B2561D94-212F-457B-AFB3-2A43FAF60559}" type="datetimeFigureOut">
               <a:rPr lang="en-US" smtClean="0"/>
-              <a:t>5/31/2021</a:t>
+              <a:t>6/1/2021</a:t>
             </a:fld>
             <a:endParaRPr lang="en-US"/>
           </a:p>
@@ -8787,7 +8873,7 @@
           <a:p>
             <a:fld id="{B2561D94-212F-457B-AFB3-2A43FAF60559}" type="datetimeFigureOut">
               <a:rPr lang="en-US" smtClean="0"/>
-              <a:t>5/31/2021</a:t>
+              <a:t>6/1/2021</a:t>
             </a:fld>
             <a:endParaRPr lang="en-US"/>
           </a:p>
@@ -9133,7 +9219,7 @@
           <a:p>
             <a:fld id="{B2561D94-212F-457B-AFB3-2A43FAF60559}" type="datetimeFigureOut">
               <a:rPr lang="en-US" smtClean="0"/>
-              <a:t>5/31/2021</a:t>
+              <a:t>6/1/2021</a:t>
             </a:fld>
             <a:endParaRPr lang="en-US"/>
           </a:p>
@@ -9521,7 +9607,7 @@
           <a:p>
             <a:fld id="{B2561D94-212F-457B-AFB3-2A43FAF60559}" type="datetimeFigureOut">
               <a:rPr lang="en-US" smtClean="0"/>
-              <a:t>5/31/2021</a:t>
+              <a:t>6/1/2021</a:t>
             </a:fld>
             <a:endParaRPr lang="en-US"/>
           </a:p>
@@ -9799,7 +9885,7 @@
           <a:p>
             <a:fld id="{B2561D94-212F-457B-AFB3-2A43FAF60559}" type="datetimeFigureOut">
               <a:rPr lang="en-US" smtClean="0"/>
-              <a:t>5/31/2021</a:t>
+              <a:t>6/1/2021</a:t>
             </a:fld>
             <a:endParaRPr lang="en-US"/>
           </a:p>
@@ -10394,6 +10480,599 @@
 <file path=ppt/slides/slide10.xml><?xml version="1.0" encoding="utf-8"?>
 <p:sld xmlns:a="http://schemas.openxmlformats.org/drawingml/2006/main" xmlns:r="http://schemas.openxmlformats.org/officeDocument/2006/relationships" xmlns:p="http://schemas.openxmlformats.org/presentationml/2006/main">
   <p:cSld>
+    <p:spTree>
+      <p:nvGrpSpPr>
+        <p:cNvPr id="1" name=""/>
+        <p:cNvGrpSpPr/>
+        <p:nvPr/>
+      </p:nvGrpSpPr>
+      <p:grpSpPr>
+        <a:xfrm>
+          <a:off x="0" y="0"/>
+          <a:ext cx="0" cy="0"/>
+          <a:chOff x="0" y="0"/>
+          <a:chExt cx="0" cy="0"/>
+        </a:xfrm>
+      </p:grpSpPr>
+      <p:sp>
+        <p:nvSpPr>
+          <p:cNvPr id="2" name="Title 1">
+            <a:extLst>
+              <a:ext uri="{FF2B5EF4-FFF2-40B4-BE49-F238E27FC236}">
+                <a16:creationId xmlns:a16="http://schemas.microsoft.com/office/drawing/2014/main" id="{C7600063-9854-4256-A64F-465ACA8ACDDC}"/>
+              </a:ext>
+            </a:extLst>
+          </p:cNvPr>
+          <p:cNvSpPr>
+            <a:spLocks noGrp="1"/>
+          </p:cNvSpPr>
+          <p:nvPr>
+            <p:ph type="title"/>
+          </p:nvPr>
+        </p:nvSpPr>
+        <p:spPr/>
+        <p:txBody>
+          <a:bodyPr/>
+          <a:lstStyle/>
+          <a:p>
+            <a:r>
+              <a:rPr lang="en-US" dirty="0"/>
+              <a:t>Project challenges</a:t>
+            </a:r>
+          </a:p>
+        </p:txBody>
+      </p:sp>
+      <p:sp>
+        <p:nvSpPr>
+          <p:cNvPr id="3" name="Text Placeholder 2">
+            <a:extLst>
+              <a:ext uri="{FF2B5EF4-FFF2-40B4-BE49-F238E27FC236}">
+                <a16:creationId xmlns:a16="http://schemas.microsoft.com/office/drawing/2014/main" id="{8A5A7F28-4333-4449-9EB2-D5249836DE9F}"/>
+              </a:ext>
+            </a:extLst>
+          </p:cNvPr>
+          <p:cNvSpPr>
+            <a:spLocks noGrp="1"/>
+          </p:cNvSpPr>
+          <p:nvPr>
+            <p:ph type="body" idx="1"/>
+          </p:nvPr>
+        </p:nvSpPr>
+        <p:spPr/>
+        <p:txBody>
+          <a:bodyPr/>
+          <a:lstStyle/>
+          <a:p>
+            <a:endParaRPr lang="en-US"/>
+          </a:p>
+        </p:txBody>
+      </p:sp>
+    </p:spTree>
+    <p:extLst>
+      <p:ext uri="{BB962C8B-B14F-4D97-AF65-F5344CB8AC3E}">
+        <p14:creationId xmlns:p14="http://schemas.microsoft.com/office/powerpoint/2010/main" val="1096313556"/>
+      </p:ext>
+    </p:extLst>
+  </p:cSld>
+  <p:clrMapOvr>
+    <a:masterClrMapping/>
+  </p:clrMapOvr>
+</p:sld>
+</file>
+
+<file path=ppt/slides/slide11.xml><?xml version="1.0" encoding="utf-8"?>
+<p:sld xmlns:a="http://schemas.openxmlformats.org/drawingml/2006/main" xmlns:r="http://schemas.openxmlformats.org/officeDocument/2006/relationships" xmlns:p="http://schemas.openxmlformats.org/presentationml/2006/main">
+  <p:cSld>
+    <p:bg>
+      <p:bgPr>
+        <a:solidFill>
+          <a:schemeClr val="bg2"/>
+        </a:solidFill>
+        <a:effectLst/>
+      </p:bgPr>
+    </p:bg>
+    <p:spTree>
+      <p:nvGrpSpPr>
+        <p:cNvPr id="1" name=""/>
+        <p:cNvGrpSpPr/>
+        <p:nvPr/>
+      </p:nvGrpSpPr>
+      <p:grpSpPr>
+        <a:xfrm>
+          <a:off x="0" y="0"/>
+          <a:ext cx="0" cy="0"/>
+          <a:chOff x="0" y="0"/>
+          <a:chExt cx="0" cy="0"/>
+        </a:xfrm>
+      </p:grpSpPr>
+      <p:grpSp>
+        <p:nvGrpSpPr>
+          <p:cNvPr id="71" name="Group 70">
+            <a:extLst>
+              <a:ext uri="{FF2B5EF4-FFF2-40B4-BE49-F238E27FC236}">
+                <a16:creationId xmlns:a16="http://schemas.microsoft.com/office/drawing/2014/main" id="{449BC34D-9C23-4D6D-8213-1F471AF85B3F}"/>
+              </a:ext>
+              <a:ext uri="{C183D7F6-B498-43B3-948B-1728B52AA6E4}">
+                <adec:decorative xmlns:adec="http://schemas.microsoft.com/office/drawing/2017/decorative" val="1"/>
+              </a:ext>
+            </a:extLst>
+          </p:cNvPr>
+          <p:cNvGrpSpPr>
+            <a:grpSpLocks noGrp="1" noUngrp="1" noRot="1" noChangeAspect="1" noMove="1" noResize="1"/>
+          </p:cNvGrpSpPr>
+          <p:nvPr>
+            <p:extLst>
+              <p:ext uri="{386F3935-93C4-4BCD-93E2-E3B085C9AB24}">
+                <p16:designElem xmlns:p16="http://schemas.microsoft.com/office/powerpoint/2015/main" val="1"/>
+              </p:ext>
+            </p:extLst>
+          </p:nvPr>
+        </p:nvGrpSpPr>
+        <p:grpSpPr>
+          <a:xfrm>
+            <a:off x="752858" y="744469"/>
+            <a:ext cx="10674117" cy="5349671"/>
+            <a:chOff x="752858" y="744469"/>
+            <a:chExt cx="10674117" cy="5349671"/>
+          </a:xfrm>
+        </p:grpSpPr>
+        <p:sp>
+          <p:nvSpPr>
+            <p:cNvPr id="72" name="Freeform 6">
+              <a:extLst>
+                <a:ext uri="{FF2B5EF4-FFF2-40B4-BE49-F238E27FC236}">
+                  <a16:creationId xmlns:a16="http://schemas.microsoft.com/office/drawing/2014/main" id="{FA0F5D6C-5025-4D7E-82DD-C2C6FDA1E759}"/>
+                </a:ext>
+                <a:ext uri="{C183D7F6-B498-43B3-948B-1728B52AA6E4}">
+                  <adec:decorative xmlns:adec="http://schemas.microsoft.com/office/drawing/2017/decorative" val="1"/>
+                </a:ext>
+              </a:extLst>
+            </p:cNvPr>
+            <p:cNvSpPr/>
+            <p:nvPr>
+              <p:extLst>
+                <p:ext uri="{386F3935-93C4-4BCD-93E2-E3B085C9AB24}">
+                  <p16:designElem xmlns:p16="http://schemas.microsoft.com/office/powerpoint/2015/main" val="1"/>
+                </p:ext>
+              </p:extLst>
+            </p:nvPr>
+          </p:nvSpPr>
+          <p:spPr bwMode="auto">
+            <a:xfrm>
+              <a:off x="8151962" y="1685652"/>
+              <a:ext cx="3275013" cy="4408488"/>
+            </a:xfrm>
+            <a:custGeom>
+              <a:avLst/>
+              <a:gdLst/>
+              <a:ahLst/>
+              <a:cxnLst/>
+              <a:rect l="l" t="t" r="r" b="b"/>
+              <a:pathLst>
+                <a:path w="10000" h="10000">
+                  <a:moveTo>
+                    <a:pt x="8761" y="0"/>
+                  </a:moveTo>
+                  <a:lnTo>
+                    <a:pt x="10000" y="0"/>
+                  </a:lnTo>
+                  <a:lnTo>
+                    <a:pt x="10000" y="10000"/>
+                  </a:lnTo>
+                  <a:lnTo>
+                    <a:pt x="0" y="10000"/>
+                  </a:lnTo>
+                  <a:lnTo>
+                    <a:pt x="0" y="9126"/>
+                  </a:lnTo>
+                  <a:lnTo>
+                    <a:pt x="8761" y="9127"/>
+                  </a:lnTo>
+                  <a:lnTo>
+                    <a:pt x="8761" y="0"/>
+                  </a:lnTo>
+                  <a:close/>
+                </a:path>
+              </a:pathLst>
+            </a:custGeom>
+            <a:solidFill>
+              <a:schemeClr val="tx2"/>
+            </a:solidFill>
+            <a:ln w="0">
+              <a:noFill/>
+              <a:prstDash val="solid"/>
+              <a:round/>
+              <a:headEnd/>
+              <a:tailEnd/>
+            </a:ln>
+          </p:spPr>
+        </p:sp>
+        <p:sp>
+          <p:nvSpPr>
+            <p:cNvPr id="73" name="Freeform 6">
+              <a:extLst>
+                <a:ext uri="{FF2B5EF4-FFF2-40B4-BE49-F238E27FC236}">
+                  <a16:creationId xmlns:a16="http://schemas.microsoft.com/office/drawing/2014/main" id="{E2AF2C17-4AB4-4402-B84B-129EF95D161C}"/>
+                </a:ext>
+                <a:ext uri="{C183D7F6-B498-43B3-948B-1728B52AA6E4}">
+                  <adec:decorative xmlns:adec="http://schemas.microsoft.com/office/drawing/2017/decorative" val="1"/>
+                </a:ext>
+              </a:extLst>
+            </p:cNvPr>
+            <p:cNvSpPr/>
+            <p:nvPr>
+              <p:extLst>
+                <p:ext uri="{386F3935-93C4-4BCD-93E2-E3B085C9AB24}">
+                  <p16:designElem xmlns:p16="http://schemas.microsoft.com/office/powerpoint/2015/main" val="1"/>
+                </p:ext>
+              </p:extLst>
+            </p:nvPr>
+          </p:nvSpPr>
+          <p:spPr bwMode="auto">
+            <a:xfrm flipH="1" flipV="1">
+              <a:off x="752858" y="744469"/>
+              <a:ext cx="3275668" cy="4408488"/>
+            </a:xfrm>
+            <a:custGeom>
+              <a:avLst/>
+              <a:gdLst/>
+              <a:ahLst/>
+              <a:cxnLst/>
+              <a:rect l="l" t="t" r="r" b="b"/>
+              <a:pathLst>
+                <a:path w="10002" h="10000">
+                  <a:moveTo>
+                    <a:pt x="8763" y="0"/>
+                  </a:moveTo>
+                  <a:lnTo>
+                    <a:pt x="10002" y="0"/>
+                  </a:lnTo>
+                  <a:lnTo>
+                    <a:pt x="10002" y="10000"/>
+                  </a:lnTo>
+                  <a:lnTo>
+                    <a:pt x="2" y="10000"/>
+                  </a:lnTo>
+                  <a:cubicBezTo>
+                    <a:pt x="-2" y="9698"/>
+                    <a:pt x="4" y="9427"/>
+                    <a:pt x="0" y="9125"/>
+                  </a:cubicBezTo>
+                  <a:lnTo>
+                    <a:pt x="8763" y="9128"/>
+                  </a:lnTo>
+                  <a:lnTo>
+                    <a:pt x="8763" y="0"/>
+                  </a:lnTo>
+                  <a:close/>
+                </a:path>
+              </a:pathLst>
+            </a:custGeom>
+            <a:solidFill>
+              <a:schemeClr val="tx2"/>
+            </a:solidFill>
+            <a:ln w="0">
+              <a:noFill/>
+              <a:prstDash val="solid"/>
+              <a:round/>
+              <a:headEnd/>
+              <a:tailEnd/>
+            </a:ln>
+          </p:spPr>
+        </p:sp>
+      </p:grpSp>
+      <p:sp useBgFill="1">
+        <p:nvSpPr>
+          <p:cNvPr id="75" name="Rectangle 74">
+            <a:extLst>
+              <a:ext uri="{FF2B5EF4-FFF2-40B4-BE49-F238E27FC236}">
+                <a16:creationId xmlns:a16="http://schemas.microsoft.com/office/drawing/2014/main" id="{1F9A0C1C-8ABC-401B-8FE9-AC9327C4C587}"/>
+              </a:ext>
+              <a:ext uri="{C183D7F6-B498-43B3-948B-1728B52AA6E4}">
+                <adec:decorative xmlns:adec="http://schemas.microsoft.com/office/drawing/2017/decorative" val="1"/>
+              </a:ext>
+            </a:extLst>
+          </p:cNvPr>
+          <p:cNvSpPr>
+            <a:spLocks noGrp="1" noRot="1" noChangeAspect="1" noMove="1" noResize="1" noEditPoints="1" noAdjustHandles="1" noChangeArrowheads="1" noChangeShapeType="1" noTextEdit="1"/>
+          </p:cNvSpPr>
+          <p:nvPr>
+            <p:extLst>
+              <p:ext uri="{386F3935-93C4-4BCD-93E2-E3B085C9AB24}">
+                <p16:designElem xmlns:p16="http://schemas.microsoft.com/office/powerpoint/2015/main" val="1"/>
+              </p:ext>
+            </p:extLst>
+          </p:nvPr>
+        </p:nvSpPr>
+        <p:spPr>
+          <a:xfrm>
+            <a:off x="0" y="0"/>
+            <a:ext cx="12192000" cy="6858000"/>
+          </a:xfrm>
+          <a:prstGeom prst="rect">
+            <a:avLst/>
+          </a:prstGeom>
+          <a:ln>
+            <a:noFill/>
+          </a:ln>
+        </p:spPr>
+        <p:style>
+          <a:lnRef idx="2">
+            <a:schemeClr val="accent1">
+              <a:shade val="50000"/>
+            </a:schemeClr>
+          </a:lnRef>
+          <a:fillRef idx="1001">
+            <a:schemeClr val="lt2"/>
+          </a:fillRef>
+          <a:effectRef idx="0">
+            <a:schemeClr val="accent1"/>
+          </a:effectRef>
+          <a:fontRef idx="minor">
+            <a:schemeClr val="lt1"/>
+          </a:fontRef>
+        </p:style>
+        <p:txBody>
+          <a:bodyPr rtlCol="0" anchor="ctr"/>
+          <a:lstStyle/>
+          <a:p>
+            <a:pPr algn="ctr"/>
+            <a:endParaRPr lang="en-US"/>
+          </a:p>
+        </p:txBody>
+      </p:sp>
+      <p:sp>
+        <p:nvSpPr>
+          <p:cNvPr id="2" name="Title 1">
+            <a:extLst>
+              <a:ext uri="{FF2B5EF4-FFF2-40B4-BE49-F238E27FC236}">
+                <a16:creationId xmlns:a16="http://schemas.microsoft.com/office/drawing/2014/main" id="{31BC3835-2F1E-490F-889F-A96F74A6FB9F}"/>
+              </a:ext>
+            </a:extLst>
+          </p:cNvPr>
+          <p:cNvSpPr>
+            <a:spLocks noGrp="1"/>
+          </p:cNvSpPr>
+          <p:nvPr>
+            <p:ph type="title"/>
+          </p:nvPr>
+        </p:nvSpPr>
+        <p:spPr>
+          <a:xfrm>
+            <a:off x="8154186" y="634028"/>
+            <a:ext cx="3355942" cy="3732835"/>
+          </a:xfrm>
+        </p:spPr>
+        <p:txBody>
+          <a:bodyPr vert="horz" lIns="91440" tIns="45720" rIns="91440" bIns="45720" rtlCol="0" anchor="b">
+            <a:normAutofit/>
+          </a:bodyPr>
+          <a:lstStyle/>
+          <a:p>
+            <a:pPr algn="ctr">
+              <a:lnSpc>
+                <a:spcPct val="89000"/>
+              </a:lnSpc>
+            </a:pPr>
+            <a:r>
+              <a:rPr lang="en-US" sz="4700" cap="all"/>
+              <a:t>What Objectives are needed ?</a:t>
+            </a:r>
+          </a:p>
+        </p:txBody>
+      </p:sp>
+      <p:sp>
+        <p:nvSpPr>
+          <p:cNvPr id="77" name="Freeform 6">
+            <a:extLst>
+              <a:ext uri="{FF2B5EF4-FFF2-40B4-BE49-F238E27FC236}">
+                <a16:creationId xmlns:a16="http://schemas.microsoft.com/office/drawing/2014/main" id="{BA5783C3-2F96-40A7-A24F-30CB07AA3928}"/>
+              </a:ext>
+              <a:ext uri="{C183D7F6-B498-43B3-948B-1728B52AA6E4}">
+                <adec:decorative xmlns:adec="http://schemas.microsoft.com/office/drawing/2017/decorative" val="1"/>
+              </a:ext>
+            </a:extLst>
+          </p:cNvPr>
+          <p:cNvSpPr>
+            <a:spLocks noGrp="1" noRot="1" noChangeAspect="1" noMove="1" noResize="1" noEditPoints="1" noAdjustHandles="1" noChangeArrowheads="1" noChangeShapeType="1" noTextEdit="1"/>
+          </p:cNvSpPr>
+          <p:nvPr>
+            <p:extLst>
+              <p:ext uri="{386F3935-93C4-4BCD-93E2-E3B085C9AB24}">
+                <p16:designElem xmlns:p16="http://schemas.microsoft.com/office/powerpoint/2015/main" val="1"/>
+              </p:ext>
+            </p:extLst>
+          </p:nvPr>
+        </p:nvSpPr>
+        <p:spPr bwMode="auto">
+          <a:xfrm flipH="1" flipV="1">
+            <a:off x="649163" y="634028"/>
+            <a:ext cx="3275668" cy="4408488"/>
+          </a:xfrm>
+          <a:custGeom>
+            <a:avLst/>
+            <a:gdLst/>
+            <a:ahLst/>
+            <a:cxnLst/>
+            <a:rect l="l" t="t" r="r" b="b"/>
+            <a:pathLst>
+              <a:path w="10002" h="10000">
+                <a:moveTo>
+                  <a:pt x="8763" y="0"/>
+                </a:moveTo>
+                <a:lnTo>
+                  <a:pt x="10002" y="0"/>
+                </a:lnTo>
+                <a:lnTo>
+                  <a:pt x="10002" y="10000"/>
+                </a:lnTo>
+                <a:lnTo>
+                  <a:pt x="2" y="10000"/>
+                </a:lnTo>
+                <a:cubicBezTo>
+                  <a:pt x="-2" y="9698"/>
+                  <a:pt x="4" y="9427"/>
+                  <a:pt x="0" y="9125"/>
+                </a:cubicBezTo>
+                <a:lnTo>
+                  <a:pt x="8763" y="9128"/>
+                </a:lnTo>
+                <a:lnTo>
+                  <a:pt x="8763" y="0"/>
+                </a:lnTo>
+                <a:close/>
+              </a:path>
+            </a:pathLst>
+          </a:custGeom>
+          <a:solidFill>
+            <a:schemeClr val="tx2"/>
+          </a:solidFill>
+          <a:ln w="0">
+            <a:noFill/>
+            <a:prstDash val="solid"/>
+            <a:round/>
+            <a:headEnd/>
+            <a:tailEnd/>
+          </a:ln>
+        </p:spPr>
+      </p:sp>
+      <p:sp>
+        <p:nvSpPr>
+          <p:cNvPr id="79" name="Freeform 6">
+            <a:extLst>
+              <a:ext uri="{FF2B5EF4-FFF2-40B4-BE49-F238E27FC236}">
+                <a16:creationId xmlns:a16="http://schemas.microsoft.com/office/drawing/2014/main" id="{A9D08DBA-0326-4C4E-ACFB-576F3ABDD2D0}"/>
+              </a:ext>
+              <a:ext uri="{C183D7F6-B498-43B3-948B-1728B52AA6E4}">
+                <adec:decorative xmlns:adec="http://schemas.microsoft.com/office/drawing/2017/decorative" val="1"/>
+              </a:ext>
+            </a:extLst>
+          </p:cNvPr>
+          <p:cNvSpPr>
+            <a:spLocks noGrp="1" noRot="1" noChangeAspect="1" noMove="1" noResize="1" noEditPoints="1" noAdjustHandles="1" noChangeArrowheads="1" noChangeShapeType="1" noTextEdit="1"/>
+          </p:cNvSpPr>
+          <p:nvPr>
+            <p:extLst>
+              <p:ext uri="{386F3935-93C4-4BCD-93E2-E3B085C9AB24}">
+                <p16:designElem xmlns:p16="http://schemas.microsoft.com/office/powerpoint/2015/main" val="1"/>
+              </p:ext>
+            </p:extLst>
+          </p:nvPr>
+        </p:nvSpPr>
+        <p:spPr bwMode="auto">
+          <a:xfrm>
+            <a:off x="4494670" y="2016617"/>
+            <a:ext cx="3275013" cy="4408488"/>
+          </a:xfrm>
+          <a:custGeom>
+            <a:avLst/>
+            <a:gdLst/>
+            <a:ahLst/>
+            <a:cxnLst/>
+            <a:rect l="l" t="t" r="r" b="b"/>
+            <a:pathLst>
+              <a:path w="10000" h="10000">
+                <a:moveTo>
+                  <a:pt x="8761" y="0"/>
+                </a:moveTo>
+                <a:lnTo>
+                  <a:pt x="10000" y="0"/>
+                </a:lnTo>
+                <a:lnTo>
+                  <a:pt x="10000" y="10000"/>
+                </a:lnTo>
+                <a:lnTo>
+                  <a:pt x="0" y="10000"/>
+                </a:lnTo>
+                <a:lnTo>
+                  <a:pt x="0" y="9126"/>
+                </a:lnTo>
+                <a:lnTo>
+                  <a:pt x="8761" y="9127"/>
+                </a:lnTo>
+                <a:lnTo>
+                  <a:pt x="8761" y="0"/>
+                </a:lnTo>
+                <a:close/>
+              </a:path>
+            </a:pathLst>
+          </a:custGeom>
+          <a:solidFill>
+            <a:schemeClr val="tx2"/>
+          </a:solidFill>
+          <a:ln w="0">
+            <a:noFill/>
+            <a:prstDash val="solid"/>
+            <a:round/>
+            <a:headEnd/>
+            <a:tailEnd/>
+          </a:ln>
+        </p:spPr>
+      </p:sp>
+      <p:pic>
+        <p:nvPicPr>
+          <p:cNvPr id="2050" name="Picture 2" descr="8. Define System Requirements | CRVS Digitisation Guidebook">
+            <a:extLst>
+              <a:ext uri="{FF2B5EF4-FFF2-40B4-BE49-F238E27FC236}">
+                <a16:creationId xmlns:a16="http://schemas.microsoft.com/office/drawing/2014/main" id="{F0840090-8DC3-4AC7-8921-5A9273062276}"/>
+              </a:ext>
+            </a:extLst>
+          </p:cNvPr>
+          <p:cNvPicPr>
+            <a:picLocks noGrp="1" noChangeAspect="1" noChangeArrowheads="1"/>
+          </p:cNvPicPr>
+          <p:nvPr>
+            <p:ph idx="1"/>
+          </p:nvPr>
+        </p:nvPicPr>
+        <p:blipFill>
+          <a:blip r:embed="rId2">
+            <a:extLst>
+              <a:ext uri="{28A0092B-C50C-407E-A947-70E740481C1C}">
+                <a14:useLocalDpi xmlns:a14="http://schemas.microsoft.com/office/drawing/2010/main" val="0"/>
+              </a:ext>
+            </a:extLst>
+          </a:blip>
+          <a:stretch>
+            <a:fillRect/>
+          </a:stretch>
+        </p:blipFill>
+        <p:spPr bwMode="auto">
+          <a:xfrm>
+            <a:off x="1379023" y="2212827"/>
+            <a:ext cx="5659222" cy="2631537"/>
+          </a:xfrm>
+          <a:prstGeom prst="rect">
+            <a:avLst/>
+          </a:prstGeom>
+          <a:noFill/>
+          <a:extLst>
+            <a:ext uri="{909E8E84-426E-40DD-AFC4-6F175D3DCCD1}">
+              <a14:hiddenFill xmlns:a14="http://schemas.microsoft.com/office/drawing/2010/main">
+                <a:solidFill>
+                  <a:srgbClr val="FFFFFF"/>
+                </a:solidFill>
+              </a14:hiddenFill>
+            </a:ext>
+          </a:extLst>
+        </p:spPr>
+      </p:pic>
+    </p:spTree>
+    <p:extLst>
+      <p:ext uri="{BB962C8B-B14F-4D97-AF65-F5344CB8AC3E}">
+        <p14:creationId xmlns:p14="http://schemas.microsoft.com/office/powerpoint/2010/main" val="767357113"/>
+      </p:ext>
+    </p:extLst>
+  </p:cSld>
+  <p:clrMapOvr>
+    <a:masterClrMapping/>
+  </p:clrMapOvr>
+</p:sld>
+</file>
+
+<file path=ppt/slides/slide12.xml><?xml version="1.0" encoding="utf-8"?>
+<p:sld xmlns:a="http://schemas.openxmlformats.org/drawingml/2006/main" xmlns:r="http://schemas.openxmlformats.org/officeDocument/2006/relationships" xmlns:p="http://schemas.openxmlformats.org/presentationml/2006/main">
+  <p:cSld>
     <p:bg>
       <p:bgPr>
         <a:solidFill>
@@ -10596,7 +11275,7 @@
             </a:pPr>
             <a:r>
               <a:rPr lang="en-US" sz="2400" dirty="0"/>
-              <a:t>Every user is different</a:t>
+              <a:t>Every user is different.</a:t>
             </a:r>
           </a:p>
           <a:p>
@@ -10607,7 +11286,7 @@
             </a:pPr>
             <a:r>
               <a:rPr lang="en-US" sz="2400" dirty="0"/>
-              <a:t>Use cases can change</a:t>
+              <a:t>Use cases can change.</a:t>
             </a:r>
           </a:p>
           <a:p>
@@ -10618,7 +11297,7 @@
             </a:pPr>
             <a:r>
               <a:rPr lang="en-US" sz="2400" dirty="0"/>
-              <a:t>Unforeseen functions may need to be added</a:t>
+              <a:t>Unforeseen functions may need to be added.</a:t>
             </a:r>
           </a:p>
         </p:txBody>
@@ -10682,9 +11361,17 @@
 </p:sld>
 </file>
 
-<file path=ppt/slides/slide11.xml><?xml version="1.0" encoding="utf-8"?>
+<file path=ppt/slides/slide13.xml><?xml version="1.0" encoding="utf-8"?>
 <p:sld xmlns:a="http://schemas.openxmlformats.org/drawingml/2006/main" xmlns:r="http://schemas.openxmlformats.org/officeDocument/2006/relationships" xmlns:p="http://schemas.openxmlformats.org/presentationml/2006/main">
   <p:cSld>
+    <p:bg>
+      <p:bgPr>
+        <a:solidFill>
+          <a:schemeClr val="bg2"/>
+        </a:solidFill>
+        <a:effectLst/>
+      </p:bgPr>
+    </p:bg>
     <p:spTree>
       <p:nvGrpSpPr>
         <p:cNvPr id="1" name=""/>
@@ -10699,6 +11386,437 @@
           <a:chExt cx="0" cy="0"/>
         </a:xfrm>
       </p:grpSpPr>
+      <p:grpSp>
+        <p:nvGrpSpPr>
+          <p:cNvPr id="19" name="Group 8">
+            <a:extLst>
+              <a:ext uri="{FF2B5EF4-FFF2-40B4-BE49-F238E27FC236}">
+                <a16:creationId xmlns:a16="http://schemas.microsoft.com/office/drawing/2014/main" id="{9D9D6BF1-DFF2-4526-9D13-BF339D8C4163}"/>
+              </a:ext>
+              <a:ext uri="{C183D7F6-B498-43B3-948B-1728B52AA6E4}">
+                <adec:decorative xmlns:adec="http://schemas.microsoft.com/office/drawing/2017/decorative" val="1"/>
+              </a:ext>
+            </a:extLst>
+          </p:cNvPr>
+          <p:cNvGrpSpPr>
+            <a:grpSpLocks noGrp="1" noUngrp="1" noRot="1" noChangeAspect="1" noMove="1" noResize="1"/>
+          </p:cNvGrpSpPr>
+          <p:nvPr>
+            <p:extLst>
+              <p:ext uri="{386F3935-93C4-4BCD-93E2-E3B085C9AB24}">
+                <p16:designElem xmlns:p16="http://schemas.microsoft.com/office/powerpoint/2015/main" val="1"/>
+              </p:ext>
+            </p:extLst>
+          </p:nvPr>
+        </p:nvGrpSpPr>
+        <p:grpSpPr>
+          <a:xfrm>
+            <a:off x="752858" y="744469"/>
+            <a:ext cx="10674117" cy="5349671"/>
+            <a:chOff x="752858" y="744469"/>
+            <a:chExt cx="10674117" cy="5349671"/>
+          </a:xfrm>
+        </p:grpSpPr>
+        <p:sp>
+          <p:nvSpPr>
+            <p:cNvPr id="10" name="Freeform 6">
+              <a:extLst>
+                <a:ext uri="{FF2B5EF4-FFF2-40B4-BE49-F238E27FC236}">
+                  <a16:creationId xmlns:a16="http://schemas.microsoft.com/office/drawing/2014/main" id="{A54D4DB6-FB18-4CAE-8905-E0053C92569E}"/>
+                </a:ext>
+                <a:ext uri="{C183D7F6-B498-43B3-948B-1728B52AA6E4}">
+                  <adec:decorative xmlns:adec="http://schemas.microsoft.com/office/drawing/2017/decorative" val="1"/>
+                </a:ext>
+              </a:extLst>
+            </p:cNvPr>
+            <p:cNvSpPr/>
+            <p:nvPr>
+              <p:extLst>
+                <p:ext uri="{386F3935-93C4-4BCD-93E2-E3B085C9AB24}">
+                  <p16:designElem xmlns:p16="http://schemas.microsoft.com/office/powerpoint/2015/main" val="1"/>
+                </p:ext>
+              </p:extLst>
+            </p:nvPr>
+          </p:nvSpPr>
+          <p:spPr bwMode="auto">
+            <a:xfrm>
+              <a:off x="8151962" y="1685652"/>
+              <a:ext cx="3275013" cy="4408488"/>
+            </a:xfrm>
+            <a:custGeom>
+              <a:avLst/>
+              <a:gdLst/>
+              <a:ahLst/>
+              <a:cxnLst/>
+              <a:rect l="l" t="t" r="r" b="b"/>
+              <a:pathLst>
+                <a:path w="10000" h="10000">
+                  <a:moveTo>
+                    <a:pt x="8761" y="0"/>
+                  </a:moveTo>
+                  <a:lnTo>
+                    <a:pt x="10000" y="0"/>
+                  </a:lnTo>
+                  <a:lnTo>
+                    <a:pt x="10000" y="10000"/>
+                  </a:lnTo>
+                  <a:lnTo>
+                    <a:pt x="0" y="10000"/>
+                  </a:lnTo>
+                  <a:lnTo>
+                    <a:pt x="0" y="9126"/>
+                  </a:lnTo>
+                  <a:lnTo>
+                    <a:pt x="8761" y="9127"/>
+                  </a:lnTo>
+                  <a:lnTo>
+                    <a:pt x="8761" y="0"/>
+                  </a:lnTo>
+                  <a:close/>
+                </a:path>
+              </a:pathLst>
+            </a:custGeom>
+            <a:solidFill>
+              <a:schemeClr val="tx2"/>
+            </a:solidFill>
+            <a:ln w="0">
+              <a:noFill/>
+              <a:prstDash val="solid"/>
+              <a:round/>
+              <a:headEnd/>
+              <a:tailEnd/>
+            </a:ln>
+          </p:spPr>
+        </p:sp>
+        <p:sp>
+          <p:nvSpPr>
+            <p:cNvPr id="11" name="Freeform 6">
+              <a:extLst>
+                <a:ext uri="{FF2B5EF4-FFF2-40B4-BE49-F238E27FC236}">
+                  <a16:creationId xmlns:a16="http://schemas.microsoft.com/office/drawing/2014/main" id="{1DBD6488-9429-4FFA-8AE8-C4022C39B0F2}"/>
+                </a:ext>
+                <a:ext uri="{C183D7F6-B498-43B3-948B-1728B52AA6E4}">
+                  <adec:decorative xmlns:adec="http://schemas.microsoft.com/office/drawing/2017/decorative" val="1"/>
+                </a:ext>
+              </a:extLst>
+            </p:cNvPr>
+            <p:cNvSpPr/>
+            <p:nvPr>
+              <p:extLst>
+                <p:ext uri="{386F3935-93C4-4BCD-93E2-E3B085C9AB24}">
+                  <p16:designElem xmlns:p16="http://schemas.microsoft.com/office/powerpoint/2015/main" val="1"/>
+                </p:ext>
+              </p:extLst>
+            </p:nvPr>
+          </p:nvSpPr>
+          <p:spPr bwMode="auto">
+            <a:xfrm flipH="1" flipV="1">
+              <a:off x="752858" y="744469"/>
+              <a:ext cx="3275668" cy="4408488"/>
+            </a:xfrm>
+            <a:custGeom>
+              <a:avLst/>
+              <a:gdLst/>
+              <a:ahLst/>
+              <a:cxnLst/>
+              <a:rect l="l" t="t" r="r" b="b"/>
+              <a:pathLst>
+                <a:path w="10002" h="10000">
+                  <a:moveTo>
+                    <a:pt x="8763" y="0"/>
+                  </a:moveTo>
+                  <a:lnTo>
+                    <a:pt x="10002" y="0"/>
+                  </a:lnTo>
+                  <a:lnTo>
+                    <a:pt x="10002" y="10000"/>
+                  </a:lnTo>
+                  <a:lnTo>
+                    <a:pt x="2" y="10000"/>
+                  </a:lnTo>
+                  <a:cubicBezTo>
+                    <a:pt x="-2" y="9698"/>
+                    <a:pt x="4" y="9427"/>
+                    <a:pt x="0" y="9125"/>
+                  </a:cubicBezTo>
+                  <a:lnTo>
+                    <a:pt x="8763" y="9128"/>
+                  </a:lnTo>
+                  <a:lnTo>
+                    <a:pt x="8763" y="0"/>
+                  </a:lnTo>
+                  <a:close/>
+                </a:path>
+              </a:pathLst>
+            </a:custGeom>
+            <a:solidFill>
+              <a:schemeClr val="tx2"/>
+            </a:solidFill>
+            <a:ln w="0">
+              <a:noFill/>
+              <a:prstDash val="solid"/>
+              <a:round/>
+              <a:headEnd/>
+              <a:tailEnd/>
+            </a:ln>
+          </p:spPr>
+        </p:sp>
+      </p:grpSp>
+      <p:pic>
+        <p:nvPicPr>
+          <p:cNvPr id="20" name="Picture 4" descr="Golden ripples in the water">
+            <a:extLst>
+              <a:ext uri="{FF2B5EF4-FFF2-40B4-BE49-F238E27FC236}">
+                <a16:creationId xmlns:a16="http://schemas.microsoft.com/office/drawing/2014/main" id="{AFFEB520-6364-4736-911F-EDBF2F011056}"/>
+              </a:ext>
+            </a:extLst>
+          </p:cNvPr>
+          <p:cNvPicPr>
+            <a:picLocks noChangeAspect="1"/>
+          </p:cNvPicPr>
+          <p:nvPr/>
+        </p:nvPicPr>
+        <p:blipFill rotWithShape="1">
+          <a:blip r:embed="rId3">
+            <a:grayscl/>
+          </a:blip>
+          <a:srcRect t="2888" b="12826"/>
+          <a:stretch/>
+        </p:blipFill>
+        <p:spPr>
+          <a:xfrm>
+            <a:off x="20" y="10"/>
+            <a:ext cx="12191980" cy="6859300"/>
+          </a:xfrm>
+          <a:prstGeom prst="rect">
+            <a:avLst/>
+          </a:prstGeom>
+        </p:spPr>
+      </p:pic>
+      <p:sp>
+        <p:nvSpPr>
+          <p:cNvPr id="21" name="Rectangle 12">
+            <a:extLst>
+              <a:ext uri="{FF2B5EF4-FFF2-40B4-BE49-F238E27FC236}">
+                <a16:creationId xmlns:a16="http://schemas.microsoft.com/office/drawing/2014/main" id="{334BA972-C640-4E2E-B1AC-162A1ABA4CE1}"/>
+              </a:ext>
+              <a:ext uri="{C183D7F6-B498-43B3-948B-1728B52AA6E4}">
+                <adec:decorative xmlns:adec="http://schemas.microsoft.com/office/drawing/2017/decorative" val="1"/>
+              </a:ext>
+            </a:extLst>
+          </p:cNvPr>
+          <p:cNvSpPr>
+            <a:spLocks noGrp="1" noRot="1" noChangeAspect="1" noMove="1" noResize="1" noEditPoints="1" noAdjustHandles="1" noChangeArrowheads="1" noChangeShapeType="1" noTextEdit="1"/>
+          </p:cNvSpPr>
+          <p:nvPr>
+            <p:extLst>
+              <p:ext uri="{386F3935-93C4-4BCD-93E2-E3B085C9AB24}">
+                <p16:designElem xmlns:p16="http://schemas.microsoft.com/office/powerpoint/2015/main" val="1"/>
+              </p:ext>
+            </p:extLst>
+          </p:nvPr>
+        </p:nvSpPr>
+        <p:spPr>
+          <a:xfrm>
+            <a:off x="-258" y="0"/>
+            <a:ext cx="12192000" cy="6858000"/>
+          </a:xfrm>
+          <a:prstGeom prst="rect">
+            <a:avLst/>
+          </a:prstGeom>
+          <a:gradFill flip="none" rotWithShape="1">
+            <a:gsLst>
+              <a:gs pos="30000">
+                <a:schemeClr val="bg2">
+                  <a:alpha val="75000"/>
+                </a:schemeClr>
+              </a:gs>
+              <a:gs pos="100000">
+                <a:schemeClr val="bg2"/>
+              </a:gs>
+            </a:gsLst>
+            <a:path path="circle">
+              <a:fillToRect l="50000" t="50000" r="50000" b="50000"/>
+            </a:path>
+            <a:tileRect/>
+          </a:gradFill>
+          <a:ln>
+            <a:noFill/>
+          </a:ln>
+        </p:spPr>
+        <p:style>
+          <a:lnRef idx="2">
+            <a:schemeClr val="accent1">
+              <a:shade val="50000"/>
+            </a:schemeClr>
+          </a:lnRef>
+          <a:fillRef idx="1">
+            <a:schemeClr val="accent1"/>
+          </a:fillRef>
+          <a:effectRef idx="0">
+            <a:schemeClr val="accent1"/>
+          </a:effectRef>
+          <a:fontRef idx="minor">
+            <a:schemeClr val="lt1"/>
+          </a:fontRef>
+        </p:style>
+        <p:txBody>
+          <a:bodyPr rtlCol="0" anchor="ctr"/>
+          <a:lstStyle/>
+          <a:p>
+            <a:pPr algn="ctr"/>
+            <a:endParaRPr lang="en-US"/>
+          </a:p>
+        </p:txBody>
+      </p:sp>
+      <p:sp>
+        <p:nvSpPr>
+          <p:cNvPr id="22" name="Freeform 6">
+            <a:extLst>
+              <a:ext uri="{FF2B5EF4-FFF2-40B4-BE49-F238E27FC236}">
+                <a16:creationId xmlns:a16="http://schemas.microsoft.com/office/drawing/2014/main" id="{AB4EBAB6-4362-4DD4-B97E-6707AFA57012}"/>
+              </a:ext>
+              <a:ext uri="{C183D7F6-B498-43B3-948B-1728B52AA6E4}">
+                <adec:decorative xmlns:adec="http://schemas.microsoft.com/office/drawing/2017/decorative" val="1"/>
+              </a:ext>
+            </a:extLst>
+          </p:cNvPr>
+          <p:cNvSpPr>
+            <a:spLocks noGrp="1" noRot="1" noChangeAspect="1" noMove="1" noResize="1" noEditPoints="1" noAdjustHandles="1" noChangeArrowheads="1" noChangeShapeType="1" noTextEdit="1"/>
+          </p:cNvSpPr>
+          <p:nvPr>
+            <p:extLst>
+              <p:ext uri="{386F3935-93C4-4BCD-93E2-E3B085C9AB24}">
+                <p16:designElem xmlns:p16="http://schemas.microsoft.com/office/powerpoint/2015/main" val="1"/>
+              </p:ext>
+            </p:extLst>
+          </p:nvPr>
+        </p:nvSpPr>
+        <p:spPr bwMode="auto">
+          <a:xfrm flipH="1" flipV="1">
+            <a:off x="752858" y="744469"/>
+            <a:ext cx="3275668" cy="4408488"/>
+          </a:xfrm>
+          <a:custGeom>
+            <a:avLst/>
+            <a:gdLst/>
+            <a:ahLst/>
+            <a:cxnLst/>
+            <a:rect l="l" t="t" r="r" b="b"/>
+            <a:pathLst>
+              <a:path w="10002" h="10000">
+                <a:moveTo>
+                  <a:pt x="8763" y="0"/>
+                </a:moveTo>
+                <a:lnTo>
+                  <a:pt x="10002" y="0"/>
+                </a:lnTo>
+                <a:lnTo>
+                  <a:pt x="10002" y="10000"/>
+                </a:lnTo>
+                <a:lnTo>
+                  <a:pt x="2" y="10000"/>
+                </a:lnTo>
+                <a:cubicBezTo>
+                  <a:pt x="-2" y="9698"/>
+                  <a:pt x="4" y="9427"/>
+                  <a:pt x="0" y="9125"/>
+                </a:cubicBezTo>
+                <a:lnTo>
+                  <a:pt x="8763" y="9128"/>
+                </a:lnTo>
+                <a:lnTo>
+                  <a:pt x="8763" y="0"/>
+                </a:lnTo>
+                <a:close/>
+              </a:path>
+            </a:pathLst>
+          </a:custGeom>
+          <a:solidFill>
+            <a:schemeClr val="tx2"/>
+          </a:solidFill>
+          <a:ln w="0">
+            <a:noFill/>
+            <a:prstDash val="solid"/>
+            <a:round/>
+            <a:headEnd/>
+            <a:tailEnd/>
+          </a:ln>
+        </p:spPr>
+      </p:sp>
+      <p:sp>
+        <p:nvSpPr>
+          <p:cNvPr id="23" name="Freeform 6">
+            <a:extLst>
+              <a:ext uri="{FF2B5EF4-FFF2-40B4-BE49-F238E27FC236}">
+                <a16:creationId xmlns:a16="http://schemas.microsoft.com/office/drawing/2014/main" id="{2FA5E0A6-4D2A-405F-AA56-A8E597834255}"/>
+              </a:ext>
+              <a:ext uri="{C183D7F6-B498-43B3-948B-1728B52AA6E4}">
+                <adec:decorative xmlns:adec="http://schemas.microsoft.com/office/drawing/2017/decorative" val="1"/>
+              </a:ext>
+            </a:extLst>
+          </p:cNvPr>
+          <p:cNvSpPr>
+            <a:spLocks noGrp="1" noRot="1" noChangeAspect="1" noMove="1" noResize="1" noEditPoints="1" noAdjustHandles="1" noChangeArrowheads="1" noChangeShapeType="1" noTextEdit="1"/>
+          </p:cNvSpPr>
+          <p:nvPr>
+            <p:extLst>
+              <p:ext uri="{386F3935-93C4-4BCD-93E2-E3B085C9AB24}">
+                <p16:designElem xmlns:p16="http://schemas.microsoft.com/office/powerpoint/2015/main" val="1"/>
+              </p:ext>
+            </p:extLst>
+          </p:nvPr>
+        </p:nvSpPr>
+        <p:spPr bwMode="auto">
+          <a:xfrm>
+            <a:off x="8151962" y="1685652"/>
+            <a:ext cx="3275013" cy="4408488"/>
+          </a:xfrm>
+          <a:custGeom>
+            <a:avLst/>
+            <a:gdLst/>
+            <a:ahLst/>
+            <a:cxnLst/>
+            <a:rect l="l" t="t" r="r" b="b"/>
+            <a:pathLst>
+              <a:path w="10000" h="10000">
+                <a:moveTo>
+                  <a:pt x="8761" y="0"/>
+                </a:moveTo>
+                <a:lnTo>
+                  <a:pt x="10000" y="0"/>
+                </a:lnTo>
+                <a:lnTo>
+                  <a:pt x="10000" y="10000"/>
+                </a:lnTo>
+                <a:lnTo>
+                  <a:pt x="0" y="10000"/>
+                </a:lnTo>
+                <a:lnTo>
+                  <a:pt x="0" y="9126"/>
+                </a:lnTo>
+                <a:lnTo>
+                  <a:pt x="8761" y="9127"/>
+                </a:lnTo>
+                <a:lnTo>
+                  <a:pt x="8761" y="0"/>
+                </a:lnTo>
+                <a:close/>
+              </a:path>
+            </a:pathLst>
+          </a:custGeom>
+          <a:solidFill>
+            <a:schemeClr val="tx2"/>
+          </a:solidFill>
+          <a:ln w="0">
+            <a:noFill/>
+            <a:prstDash val="solid"/>
+            <a:round/>
+            <a:headEnd/>
+            <a:tailEnd/>
+          </a:ln>
+        </p:spPr>
+      </p:sp>
       <p:sp>
         <p:nvSpPr>
           <p:cNvPr id="2" name="Title 1">
@@ -10715,13 +11833,21 @@
             <p:ph type="title"/>
           </p:nvPr>
         </p:nvSpPr>
-        <p:spPr/>
+        <p:spPr>
+          <a:xfrm>
+            <a:off x="1915128" y="1788454"/>
+            <a:ext cx="8361229" cy="2098226"/>
+          </a:xfrm>
+        </p:spPr>
         <p:txBody>
-          <a:bodyPr/>
+          <a:bodyPr vert="horz" lIns="91440" tIns="45720" rIns="91440" bIns="45720" rtlCol="0" anchor="b">
+            <a:normAutofit/>
+          </a:bodyPr>
           <a:lstStyle/>
           <a:p>
+            <a:pPr algn="ctr"/>
             <a:r>
-              <a:rPr lang="en-US" dirty="0"/>
+              <a:rPr lang="en-US"/>
               <a:t>Reflection</a:t>
             </a:r>
           </a:p>
@@ -10743,12 +11869,24 @@
             <p:ph type="body" idx="1"/>
           </p:nvPr>
         </p:nvSpPr>
-        <p:spPr/>
+        <p:spPr>
+          <a:xfrm>
+            <a:off x="2679906" y="3956279"/>
+            <a:ext cx="6831673" cy="1086237"/>
+          </a:xfrm>
+        </p:spPr>
         <p:txBody>
-          <a:bodyPr/>
+          <a:bodyPr vert="horz" lIns="91440" tIns="45720" rIns="91440" bIns="45720" rtlCol="0">
+            <a:normAutofit/>
+          </a:bodyPr>
           <a:lstStyle/>
           <a:p>
-            <a:endParaRPr lang="en-US"/>
+            <a:pPr algn="ctr"/>
+            <a:endParaRPr lang="en-US" sz="2300">
+              <a:solidFill>
+                <a:srgbClr val="191B0E"/>
+              </a:solidFill>
+            </a:endParaRPr>
           </a:p>
         </p:txBody>
       </p:sp>
@@ -10765,9 +11903,17 @@
 </p:sld>
 </file>
 
-<file path=ppt/slides/slide12.xml><?xml version="1.0" encoding="utf-8"?>
+<file path=ppt/slides/slide14.xml><?xml version="1.0" encoding="utf-8"?>
 <p:sld xmlns:a="http://schemas.openxmlformats.org/drawingml/2006/main" xmlns:r="http://schemas.openxmlformats.org/officeDocument/2006/relationships" xmlns:p="http://schemas.openxmlformats.org/presentationml/2006/main">
   <p:cSld>
+    <p:bg>
+      <p:bgPr>
+        <a:solidFill>
+          <a:schemeClr val="bg2"/>
+        </a:solidFill>
+        <a:effectLst/>
+      </p:bgPr>
+    </p:bg>
     <p:spTree>
       <p:nvGrpSpPr>
         <p:cNvPr id="1" name=""/>
@@ -10784,6 +11930,61 @@
       </p:grpSpPr>
       <p:sp>
         <p:nvSpPr>
+          <p:cNvPr id="73" name="Rectangle 72">
+            <a:extLst>
+              <a:ext uri="{FF2B5EF4-FFF2-40B4-BE49-F238E27FC236}">
+                <a16:creationId xmlns:a16="http://schemas.microsoft.com/office/drawing/2014/main" id="{1C47D4F4-0CFE-4B87-8C7E-3681081D3C5A}"/>
+              </a:ext>
+              <a:ext uri="{C183D7F6-B498-43B3-948B-1728B52AA6E4}">
+                <adec:decorative xmlns:adec="http://schemas.microsoft.com/office/drawing/2017/decorative" val="1"/>
+              </a:ext>
+            </a:extLst>
+          </p:cNvPr>
+          <p:cNvSpPr>
+            <a:spLocks noGrp="1" noRot="1" noChangeAspect="1" noMove="1" noResize="1" noEditPoints="1" noAdjustHandles="1" noChangeArrowheads="1" noChangeShapeType="1" noTextEdit="1"/>
+          </p:cNvSpPr>
+          <p:nvPr>
+            <p:extLst>
+              <p:ext uri="{386F3935-93C4-4BCD-93E2-E3B085C9AB24}">
+                <p16:designElem xmlns:p16="http://schemas.microsoft.com/office/powerpoint/2015/main" val="1"/>
+              </p:ext>
+            </p:extLst>
+          </p:nvPr>
+        </p:nvSpPr>
+        <p:spPr>
+          <a:xfrm>
+            <a:off x="478095" y="376"/>
+            <a:ext cx="228600" cy="6858000"/>
+          </a:xfrm>
+          <a:prstGeom prst="rect">
+            <a:avLst/>
+          </a:prstGeom>
+          <a:solidFill>
+            <a:schemeClr val="tx2"/>
+          </a:solidFill>
+          <a:ln>
+            <a:noFill/>
+          </a:ln>
+        </p:spPr>
+        <p:style>
+          <a:lnRef idx="2">
+            <a:schemeClr val="accent1">
+              <a:shade val="50000"/>
+            </a:schemeClr>
+          </a:lnRef>
+          <a:fillRef idx="1">
+            <a:schemeClr val="accent1"/>
+          </a:fillRef>
+          <a:effectRef idx="0">
+            <a:schemeClr val="accent1"/>
+          </a:effectRef>
+          <a:fontRef idx="minor">
+            <a:schemeClr val="lt1"/>
+          </a:fontRef>
+        </p:style>
+      </p:sp>
+      <p:sp>
+        <p:nvSpPr>
           <p:cNvPr id="2" name="Title 1">
             <a:extLst>
               <a:ext uri="{FF2B5EF4-FFF2-40B4-BE49-F238E27FC236}">
@@ -10798,12 +11999,34 @@
             <p:ph type="title"/>
           </p:nvPr>
         </p:nvSpPr>
-        <p:spPr/>
+        <p:spPr>
+          <a:xfrm>
+            <a:off x="845901" y="671209"/>
+            <a:ext cx="4705346" cy="1485900"/>
+          </a:xfrm>
+        </p:spPr>
         <p:txBody>
-          <a:bodyPr/>
+          <a:bodyPr vert="horz" lIns="91440" tIns="45720" rIns="91440" bIns="45720" rtlCol="0" anchor="t">
+            <a:normAutofit/>
+          </a:bodyPr>
           <a:lstStyle/>
           <a:p>
-            <a:endParaRPr lang="en-US"/>
+            <a:pPr>
+              <a:lnSpc>
+                <a:spcPct val="89000"/>
+              </a:lnSpc>
+            </a:pPr>
+            <a:r>
+              <a:rPr lang="en-US" sz="4400" dirty="0">
+                <a:solidFill>
+                  <a:schemeClr val="tx1">
+                    <a:lumMod val="75000"/>
+                    <a:lumOff val="25000"/>
+                  </a:schemeClr>
+                </a:solidFill>
+              </a:rPr>
+              <a:t>What did I learn ?</a:t>
+            </a:r>
           </a:p>
         </p:txBody>
       </p:sp>
@@ -10823,40 +12046,131 @@
             <p:ph idx="1"/>
           </p:nvPr>
         </p:nvSpPr>
-        <p:spPr/>
+        <p:spPr>
+          <a:xfrm>
+            <a:off x="807894" y="2910192"/>
+            <a:ext cx="4743353" cy="3581400"/>
+          </a:xfrm>
+        </p:spPr>
         <p:txBody>
-          <a:bodyPr/>
+          <a:bodyPr vert="horz" lIns="91440" tIns="45720" rIns="91440" bIns="45720" rtlCol="0">
+            <a:normAutofit/>
+          </a:bodyPr>
           <a:lstStyle/>
           <a:p>
-            <a:endParaRPr lang="en-US"/>
+            <a:pPr>
+              <a:lnSpc>
+                <a:spcPct val="150000"/>
+              </a:lnSpc>
+            </a:pPr>
+            <a:r>
+              <a:rPr lang="en-US" dirty="0"/>
+              <a:t>Writing to a particular audience.</a:t>
+            </a:r>
+          </a:p>
+          <a:p>
+            <a:pPr>
+              <a:lnSpc>
+                <a:spcPct val="150000"/>
+              </a:lnSpc>
+            </a:pPr>
+            <a:r>
+              <a:rPr lang="en-US" dirty="0"/>
+              <a:t>Technical writing formatting.</a:t>
+            </a:r>
           </a:p>
         </p:txBody>
       </p:sp>
-      <p:sp>
-        <p:nvSpPr>
-          <p:cNvPr id="4" name="Text Placeholder 3">
+      <p:pic>
+        <p:nvPicPr>
+          <p:cNvPr id="3074" name="Picture 2" descr="Best Technical Writing Certifications in 2021">
             <a:extLst>
               <a:ext uri="{FF2B5EF4-FFF2-40B4-BE49-F238E27FC236}">
-                <a16:creationId xmlns:a16="http://schemas.microsoft.com/office/drawing/2014/main" id="{151FD4C5-9E42-4B1D-8C3D-4291EA7830CC}"/>
+                <a16:creationId xmlns:a16="http://schemas.microsoft.com/office/drawing/2014/main" id="{9F47B86F-8C2E-46CB-8E0B-C299D1532506}"/>
               </a:ext>
             </a:extLst>
           </p:cNvPr>
-          <p:cNvSpPr>
-            <a:spLocks noGrp="1"/>
-          </p:cNvSpPr>
-          <p:nvPr>
-            <p:ph type="body" sz="half" idx="2"/>
-          </p:nvPr>
-        </p:nvSpPr>
-        <p:spPr/>
-        <p:txBody>
-          <a:bodyPr/>
-          <a:lstStyle/>
-          <a:p>
-            <a:endParaRPr lang="en-US"/>
-          </a:p>
-        </p:txBody>
-      </p:sp>
+          <p:cNvPicPr>
+            <a:picLocks noChangeAspect="1" noChangeArrowheads="1"/>
+          </p:cNvPicPr>
+          <p:nvPr/>
+        </p:nvPicPr>
+        <p:blipFill rotWithShape="1">
+          <a:blip r:embed="rId2">
+            <a:extLst>
+              <a:ext uri="{28A0092B-C50C-407E-A947-70E740481C1C}">
+                <a14:useLocalDpi xmlns:a14="http://schemas.microsoft.com/office/drawing/2010/main" val="0"/>
+              </a:ext>
+            </a:extLst>
+          </a:blip>
+          <a:srcRect r="5556" b="8"/>
+          <a:stretch/>
+        </p:blipFill>
+        <p:spPr bwMode="auto">
+          <a:xfrm>
+            <a:off x="6742277" y="685800"/>
+            <a:ext cx="4806252" cy="3368663"/>
+          </a:xfrm>
+          <a:prstGeom prst="rect">
+            <a:avLst/>
+          </a:prstGeom>
+          <a:noFill/>
+          <a:extLst>
+            <a:ext uri="{909E8E84-426E-40DD-AFC4-6F175D3DCCD1}">
+              <a14:hiddenFill xmlns:a14="http://schemas.microsoft.com/office/drawing/2010/main">
+                <a:solidFill>
+                  <a:srgbClr val="FFFFFF"/>
+                </a:solidFill>
+              </a14:hiddenFill>
+            </a:ext>
+          </a:extLst>
+        </p:spPr>
+      </p:pic>
+      <p:pic>
+        <p:nvPicPr>
+          <p:cNvPr id="5" name="Picture 4" descr="Quick Tips to Ensure You Are Writing for Your Intended Audience - Vizion  Interactive">
+            <a:extLst>
+              <a:ext uri="{FF2B5EF4-FFF2-40B4-BE49-F238E27FC236}">
+                <a16:creationId xmlns:a16="http://schemas.microsoft.com/office/drawing/2014/main" id="{5F6AA03C-6539-4E4A-B8BA-C307D45E1579}"/>
+              </a:ext>
+            </a:extLst>
+          </p:cNvPr>
+          <p:cNvPicPr>
+            <a:picLocks noChangeAspect="1" noChangeArrowheads="1"/>
+          </p:cNvPicPr>
+          <p:nvPr/>
+        </p:nvPicPr>
+        <p:blipFill rotWithShape="1">
+          <a:blip r:embed="rId3">
+            <a:extLst>
+              <a:ext uri="{28A0092B-C50C-407E-A947-70E740481C1C}">
+                <a14:useLocalDpi xmlns:a14="http://schemas.microsoft.com/office/drawing/2010/main" val="0"/>
+              </a:ext>
+            </a:extLst>
+          </a:blip>
+          <a:srcRect t="13386" r="-2" b="7929"/>
+          <a:stretch/>
+        </p:blipFill>
+        <p:spPr bwMode="auto">
+          <a:xfrm>
+            <a:off x="6729220" y="4145903"/>
+            <a:ext cx="4819307" cy="2047663"/>
+          </a:xfrm>
+          <a:prstGeom prst="rect">
+            <a:avLst/>
+          </a:prstGeom>
+          <a:noFill/>
+          <a:extLst>
+            <a:ext uri="{909E8E84-426E-40DD-AFC4-6F175D3DCCD1}">
+              <a14:hiddenFill xmlns:a14="http://schemas.microsoft.com/office/drawing/2010/main">
+                <a:solidFill>
+                  <a:srgbClr val="FFFFFF"/>
+                </a:solidFill>
+              </a14:hiddenFill>
+            </a:ext>
+          </a:extLst>
+        </p:spPr>
+      </p:pic>
     </p:spTree>
     <p:extLst>
       <p:ext uri="{BB962C8B-B14F-4D97-AF65-F5344CB8AC3E}">
@@ -10870,9 +12184,17 @@
 </p:sld>
 </file>
 
-<file path=ppt/slides/slide13.xml><?xml version="1.0" encoding="utf-8"?>
+<file path=ppt/slides/slide15.xml><?xml version="1.0" encoding="utf-8"?>
 <p:sld xmlns:a="http://schemas.openxmlformats.org/drawingml/2006/main" xmlns:r="http://schemas.openxmlformats.org/officeDocument/2006/relationships" xmlns:p="http://schemas.openxmlformats.org/presentationml/2006/main">
   <p:cSld>
+    <p:bg>
+      <p:bgPr>
+        <a:solidFill>
+          <a:schemeClr val="bg2"/>
+        </a:solidFill>
+        <a:effectLst/>
+      </p:bgPr>
+    </p:bg>
     <p:spTree>
       <p:nvGrpSpPr>
         <p:cNvPr id="1" name=""/>
@@ -10889,6 +12211,61 @@
       </p:grpSpPr>
       <p:sp>
         <p:nvSpPr>
+          <p:cNvPr id="71" name="Rectangle 70">
+            <a:extLst>
+              <a:ext uri="{FF2B5EF4-FFF2-40B4-BE49-F238E27FC236}">
+                <a16:creationId xmlns:a16="http://schemas.microsoft.com/office/drawing/2014/main" id="{2793B903-AB42-42A0-AE97-93D366679CA2}"/>
+              </a:ext>
+              <a:ext uri="{C183D7F6-B498-43B3-948B-1728B52AA6E4}">
+                <adec:decorative xmlns:adec="http://schemas.microsoft.com/office/drawing/2017/decorative" val="1"/>
+              </a:ext>
+            </a:extLst>
+          </p:cNvPr>
+          <p:cNvSpPr>
+            <a:spLocks noGrp="1" noRot="1" noChangeAspect="1" noMove="1" noResize="1" noEditPoints="1" noAdjustHandles="1" noChangeArrowheads="1" noChangeShapeType="1" noTextEdit="1"/>
+          </p:cNvSpPr>
+          <p:nvPr>
+            <p:extLst>
+              <p:ext uri="{386F3935-93C4-4BCD-93E2-E3B085C9AB24}">
+                <p16:designElem xmlns:p16="http://schemas.microsoft.com/office/powerpoint/2015/main" val="1"/>
+              </p:ext>
+            </p:extLst>
+          </p:nvPr>
+        </p:nvSpPr>
+        <p:spPr>
+          <a:xfrm>
+            <a:off x="478095" y="376"/>
+            <a:ext cx="228600" cy="6858000"/>
+          </a:xfrm>
+          <a:prstGeom prst="rect">
+            <a:avLst/>
+          </a:prstGeom>
+          <a:solidFill>
+            <a:schemeClr val="tx2"/>
+          </a:solidFill>
+          <a:ln>
+            <a:noFill/>
+          </a:ln>
+        </p:spPr>
+        <p:style>
+          <a:lnRef idx="2">
+            <a:schemeClr val="accent1">
+              <a:shade val="50000"/>
+            </a:schemeClr>
+          </a:lnRef>
+          <a:fillRef idx="1">
+            <a:schemeClr val="accent1"/>
+          </a:fillRef>
+          <a:effectRef idx="0">
+            <a:schemeClr val="accent1"/>
+          </a:effectRef>
+          <a:fontRef idx="minor">
+            <a:schemeClr val="lt1"/>
+          </a:fontRef>
+        </p:style>
+      </p:sp>
+      <p:sp>
+        <p:nvSpPr>
           <p:cNvPr id="2" name="Title 1">
             <a:extLst>
               <a:ext uri="{FF2B5EF4-FFF2-40B4-BE49-F238E27FC236}">
@@ -10903,40 +12280,126 @@
             <p:ph type="title"/>
           </p:nvPr>
         </p:nvSpPr>
-        <p:spPr/>
+        <p:spPr>
+          <a:xfrm>
+            <a:off x="7860667" y="685800"/>
+            <a:ext cx="3656419" cy="1485900"/>
+          </a:xfrm>
+        </p:spPr>
         <p:txBody>
-          <a:bodyPr/>
+          <a:bodyPr vert="horz" lIns="91440" tIns="45720" rIns="91440" bIns="45720" rtlCol="0" anchor="t">
+            <a:normAutofit fontScale="90000"/>
+          </a:bodyPr>
           <a:lstStyle/>
           <a:p>
-            <a:endParaRPr lang="en-US"/>
+            <a:r>
+              <a:rPr lang="en-US" sz="4100" dirty="0"/>
+              <a:t>What would I do it differently ?</a:t>
+            </a:r>
           </a:p>
         </p:txBody>
       </p:sp>
       <p:sp>
         <p:nvSpPr>
-          <p:cNvPr id="3" name="Content Placeholder 2">
+          <p:cNvPr id="73" name="Rectangle 72">
             <a:extLst>
               <a:ext uri="{FF2B5EF4-FFF2-40B4-BE49-F238E27FC236}">
-                <a16:creationId xmlns:a16="http://schemas.microsoft.com/office/drawing/2014/main" id="{B3FECE30-FD1D-41F0-9193-7B8EB0F0184D}"/>
+                <a16:creationId xmlns:a16="http://schemas.microsoft.com/office/drawing/2014/main" id="{BEC9E7FA-3295-45ED-8253-D23F9E44E1DA}"/>
+              </a:ext>
+              <a:ext uri="{C183D7F6-B498-43B3-948B-1728B52AA6E4}">
+                <adec:decorative xmlns:adec="http://schemas.microsoft.com/office/drawing/2017/decorative" val="1"/>
               </a:ext>
             </a:extLst>
           </p:cNvPr>
           <p:cNvSpPr>
-            <a:spLocks noGrp="1"/>
+            <a:spLocks noGrp="1" noRot="1" noChangeAspect="1" noMove="1" noResize="1" noEditPoints="1" noAdjustHandles="1" noChangeArrowheads="1" noChangeShapeType="1" noTextEdit="1"/>
           </p:cNvSpPr>
           <p:nvPr>
-            <p:ph sz="half" idx="1"/>
+            <p:extLst>
+              <p:ext uri="{386F3935-93C4-4BCD-93E2-E3B085C9AB24}">
+                <p16:designElem xmlns:p16="http://schemas.microsoft.com/office/powerpoint/2015/main" val="1"/>
+              </p:ext>
+            </p:extLst>
           </p:nvPr>
         </p:nvSpPr>
-        <p:spPr/>
-        <p:txBody>
-          <a:bodyPr/>
-          <a:lstStyle/>
-          <a:p>
-            <a:endParaRPr lang="en-US"/>
-          </a:p>
-        </p:txBody>
+        <p:spPr>
+          <a:xfrm>
+            <a:off x="478095" y="376"/>
+            <a:ext cx="228600" cy="6858000"/>
+          </a:xfrm>
+          <a:prstGeom prst="rect">
+            <a:avLst/>
+          </a:prstGeom>
+          <a:solidFill>
+            <a:schemeClr val="tx2"/>
+          </a:solidFill>
+          <a:ln>
+            <a:noFill/>
+          </a:ln>
+        </p:spPr>
+        <p:style>
+          <a:lnRef idx="2">
+            <a:schemeClr val="accent1">
+              <a:shade val="50000"/>
+            </a:schemeClr>
+          </a:lnRef>
+          <a:fillRef idx="1">
+            <a:schemeClr val="accent1"/>
+          </a:fillRef>
+          <a:effectRef idx="0">
+            <a:schemeClr val="accent1"/>
+          </a:effectRef>
+          <a:fontRef idx="minor">
+            <a:schemeClr val="lt1"/>
+          </a:fontRef>
+        </p:style>
       </p:sp>
+      <p:pic>
+        <p:nvPicPr>
+          <p:cNvPr id="4098" name="Picture 2" descr="What Would 6 Industry Icons Do Differently If Given The Chance To Be CEO  Again">
+            <a:extLst>
+              <a:ext uri="{FF2B5EF4-FFF2-40B4-BE49-F238E27FC236}">
+                <a16:creationId xmlns:a16="http://schemas.microsoft.com/office/drawing/2014/main" id="{A24A48FA-F89E-4B73-92E0-CB88A8EC4449}"/>
+              </a:ext>
+            </a:extLst>
+          </p:cNvPr>
+          <p:cNvPicPr>
+            <a:picLocks noChangeAspect="1" noChangeArrowheads="1"/>
+          </p:cNvPicPr>
+          <p:nvPr/>
+        </p:nvPicPr>
+        <p:blipFill>
+          <a:blip r:embed="rId2">
+            <a:extLst>
+              <a:ext uri="{28A0092B-C50C-407E-A947-70E740481C1C}">
+                <a14:useLocalDpi xmlns:a14="http://schemas.microsoft.com/office/drawing/2010/main" val="0"/>
+              </a:ext>
+            </a:extLst>
+          </a:blip>
+          <a:stretch>
+            <a:fillRect/>
+          </a:stretch>
+        </p:blipFill>
+        <p:spPr bwMode="auto">
+          <a:xfrm>
+            <a:off x="1023561" y="1093909"/>
+            <a:ext cx="6517065" cy="4350140"/>
+          </a:xfrm>
+          <a:prstGeom prst="rect">
+            <a:avLst/>
+          </a:prstGeom>
+          <a:noFill/>
+          <a:extLst>
+            <a:ext uri="{909E8E84-426E-40DD-AFC4-6F175D3DCCD1}">
+              <a14:hiddenFill xmlns:a14="http://schemas.microsoft.com/office/drawing/2010/main">
+                <a:solidFill>
+                  <a:srgbClr val="FFFFFF"/>
+                </a:solidFill>
+              </a14:hiddenFill>
+            </a:ext>
+          </a:extLst>
+        </p:spPr>
+      </p:pic>
       <p:sp>
         <p:nvSpPr>
           <p:cNvPr id="4" name="Content Placeholder 3">
@@ -10953,12 +12416,34 @@
             <p:ph sz="half" idx="2"/>
           </p:nvPr>
         </p:nvSpPr>
-        <p:spPr/>
+        <p:spPr>
+          <a:xfrm>
+            <a:off x="7860667" y="2286000"/>
+            <a:ext cx="3656419" cy="3581400"/>
+          </a:xfrm>
+        </p:spPr>
         <p:txBody>
-          <a:bodyPr/>
+          <a:bodyPr vert="horz" lIns="91440" tIns="45720" rIns="91440" bIns="45720" rtlCol="0">
+            <a:normAutofit/>
+          </a:bodyPr>
           <a:lstStyle/>
           <a:p>
-            <a:endParaRPr lang="en-US"/>
+            <a:r>
+              <a:rPr lang="en-US" dirty="0"/>
+              <a:t>Give more setup to the project idea.</a:t>
+            </a:r>
+          </a:p>
+          <a:p>
+            <a:r>
+              <a:rPr lang="en-US" dirty="0"/>
+              <a:t>Create multiple documents for different audiences.</a:t>
+            </a:r>
+          </a:p>
+          <a:p>
+            <a:r>
+              <a:rPr lang="en-US" dirty="0"/>
+              <a:t>Provide more audience identification when writing. </a:t>
+            </a:r>
           </a:p>
         </p:txBody>
       </p:sp>
@@ -11643,6 +13128,491 @@
     <p:bg>
       <p:bgPr>
         <a:solidFill>
+          <a:schemeClr val="bg2"/>
+        </a:solidFill>
+        <a:effectLst/>
+      </p:bgPr>
+    </p:bg>
+    <p:spTree>
+      <p:nvGrpSpPr>
+        <p:cNvPr id="1" name=""/>
+        <p:cNvGrpSpPr/>
+        <p:nvPr/>
+      </p:nvGrpSpPr>
+      <p:grpSpPr>
+        <a:xfrm>
+          <a:off x="0" y="0"/>
+          <a:ext cx="0" cy="0"/>
+          <a:chOff x="0" y="0"/>
+          <a:chExt cx="0" cy="0"/>
+        </a:xfrm>
+      </p:grpSpPr>
+      <p:sp>
+        <p:nvSpPr>
+          <p:cNvPr id="1028" name="Rectangle 70">
+            <a:extLst>
+              <a:ext uri="{FF2B5EF4-FFF2-40B4-BE49-F238E27FC236}">
+                <a16:creationId xmlns:a16="http://schemas.microsoft.com/office/drawing/2014/main" id="{69805AF4-7989-43AB-9A60-14E3F851FB30}"/>
+              </a:ext>
+              <a:ext uri="{C183D7F6-B498-43B3-948B-1728B52AA6E4}">
+                <adec:decorative xmlns:adec="http://schemas.microsoft.com/office/drawing/2017/decorative" val="1"/>
+              </a:ext>
+            </a:extLst>
+          </p:cNvPr>
+          <p:cNvSpPr>
+            <a:spLocks noGrp="1" noRot="1" noChangeAspect="1" noMove="1" noResize="1" noEditPoints="1" noAdjustHandles="1" noChangeArrowheads="1" noChangeShapeType="1" noTextEdit="1"/>
+          </p:cNvSpPr>
+          <p:nvPr>
+            <p:extLst>
+              <p:ext uri="{386F3935-93C4-4BCD-93E2-E3B085C9AB24}">
+                <p16:designElem xmlns:p16="http://schemas.microsoft.com/office/powerpoint/2015/main" val="1"/>
+              </p:ext>
+            </p:extLst>
+          </p:nvPr>
+        </p:nvSpPr>
+        <p:spPr>
+          <a:xfrm>
+            <a:off x="0" y="0"/>
+            <a:ext cx="12192000" cy="6858000"/>
+          </a:xfrm>
+          <a:prstGeom prst="rect">
+            <a:avLst/>
+          </a:prstGeom>
+          <a:solidFill>
+            <a:srgbClr val="5A6C80"/>
+          </a:solidFill>
+          <a:ln>
+            <a:noFill/>
+          </a:ln>
+        </p:spPr>
+        <p:style>
+          <a:lnRef idx="2">
+            <a:schemeClr val="accent1">
+              <a:shade val="50000"/>
+            </a:schemeClr>
+          </a:lnRef>
+          <a:fillRef idx="1">
+            <a:schemeClr val="accent1"/>
+          </a:fillRef>
+          <a:effectRef idx="0">
+            <a:schemeClr val="accent1"/>
+          </a:effectRef>
+          <a:fontRef idx="minor">
+            <a:schemeClr val="lt1"/>
+          </a:fontRef>
+        </p:style>
+        <p:txBody>
+          <a:bodyPr rtlCol="0" anchor="ctr"/>
+          <a:lstStyle/>
+          <a:p>
+            <a:pPr algn="ctr"/>
+            <a:endParaRPr lang="en-US"/>
+          </a:p>
+        </p:txBody>
+      </p:sp>
+      <p:sp>
+        <p:nvSpPr>
+          <p:cNvPr id="1029" name="Rectangle 72">
+            <a:extLst>
+              <a:ext uri="{FF2B5EF4-FFF2-40B4-BE49-F238E27FC236}">
+                <a16:creationId xmlns:a16="http://schemas.microsoft.com/office/drawing/2014/main" id="{E0036B63-B0EC-4AF3-95D3-2E2DCA25FBC6}"/>
+              </a:ext>
+              <a:ext uri="{C183D7F6-B498-43B3-948B-1728B52AA6E4}">
+                <adec:decorative xmlns:adec="http://schemas.microsoft.com/office/drawing/2017/decorative" val="1"/>
+              </a:ext>
+            </a:extLst>
+          </p:cNvPr>
+          <p:cNvSpPr>
+            <a:spLocks noGrp="1" noRot="1" noChangeAspect="1" noMove="1" noResize="1" noEditPoints="1" noAdjustHandles="1" noChangeArrowheads="1" noChangeShapeType="1" noTextEdit="1"/>
+          </p:cNvSpPr>
+          <p:nvPr>
+            <p:extLst>
+              <p:ext uri="{386F3935-93C4-4BCD-93E2-E3B085C9AB24}">
+                <p16:designElem xmlns:p16="http://schemas.microsoft.com/office/powerpoint/2015/main" val="1"/>
+              </p:ext>
+            </p:extLst>
+          </p:nvPr>
+        </p:nvSpPr>
+        <p:spPr>
+          <a:xfrm>
+            <a:off x="477012" y="480060"/>
+            <a:ext cx="11237976" cy="5897880"/>
+          </a:xfrm>
+          <a:prstGeom prst="rect">
+            <a:avLst/>
+          </a:prstGeom>
+          <a:solidFill>
+            <a:srgbClr val="FFFFFF"/>
+          </a:solidFill>
+          <a:ln>
+            <a:noFill/>
+          </a:ln>
+        </p:spPr>
+        <p:style>
+          <a:lnRef idx="2">
+            <a:schemeClr val="accent1">
+              <a:shade val="50000"/>
+            </a:schemeClr>
+          </a:lnRef>
+          <a:fillRef idx="1">
+            <a:schemeClr val="accent1"/>
+          </a:fillRef>
+          <a:effectRef idx="0">
+            <a:schemeClr val="accent1"/>
+          </a:effectRef>
+          <a:fontRef idx="minor">
+            <a:schemeClr val="lt1"/>
+          </a:fontRef>
+        </p:style>
+        <p:txBody>
+          <a:bodyPr rtlCol="0" anchor="ctr"/>
+          <a:lstStyle/>
+          <a:p>
+            <a:pPr algn="ctr"/>
+            <a:endParaRPr lang="en-US"/>
+          </a:p>
+        </p:txBody>
+      </p:sp>
+      <p:pic>
+        <p:nvPicPr>
+          <p:cNvPr id="1026" name="Picture 2" descr="Appalachia | Ohio University">
+            <a:extLst>
+              <a:ext uri="{FF2B5EF4-FFF2-40B4-BE49-F238E27FC236}">
+                <a16:creationId xmlns:a16="http://schemas.microsoft.com/office/drawing/2014/main" id="{2FC485BA-25BA-4641-A4A1-D6453D7F5BF2}"/>
+              </a:ext>
+            </a:extLst>
+          </p:cNvPr>
+          <p:cNvPicPr>
+            <a:picLocks noChangeAspect="1" noChangeArrowheads="1"/>
+          </p:cNvPicPr>
+          <p:nvPr/>
+        </p:nvPicPr>
+        <p:blipFill>
+          <a:blip r:embed="rId2">
+            <a:extLst>
+              <a:ext uri="{28A0092B-C50C-407E-A947-70E740481C1C}">
+                <a14:useLocalDpi xmlns:a14="http://schemas.microsoft.com/office/drawing/2010/main" val="0"/>
+              </a:ext>
+            </a:extLst>
+          </a:blip>
+          <a:stretch>
+            <a:fillRect/>
+          </a:stretch>
+        </p:blipFill>
+        <p:spPr bwMode="auto">
+          <a:xfrm>
+            <a:off x="1640237" y="800100"/>
+            <a:ext cx="8911526" cy="5257801"/>
+          </a:xfrm>
+          <a:prstGeom prst="rect">
+            <a:avLst/>
+          </a:prstGeom>
+          <a:noFill/>
+          <a:extLst>
+            <a:ext uri="{909E8E84-426E-40DD-AFC4-6F175D3DCCD1}">
+              <a14:hiddenFill xmlns:a14="http://schemas.microsoft.com/office/drawing/2010/main">
+                <a:solidFill>
+                  <a:srgbClr val="FFFFFF"/>
+                </a:solidFill>
+              </a14:hiddenFill>
+            </a:ext>
+          </a:extLst>
+        </p:spPr>
+      </p:pic>
+    </p:spTree>
+    <p:extLst>
+      <p:ext uri="{BB962C8B-B14F-4D97-AF65-F5344CB8AC3E}">
+        <p14:creationId xmlns:p14="http://schemas.microsoft.com/office/powerpoint/2010/main" val="600287771"/>
+      </p:ext>
+    </p:extLst>
+  </p:cSld>
+  <p:clrMapOvr>
+    <a:masterClrMapping/>
+  </p:clrMapOvr>
+</p:sld>
+</file>
+
+<file path=ppt/slides/slide4.xml><?xml version="1.0" encoding="utf-8"?>
+<p:sld xmlns:a="http://schemas.openxmlformats.org/drawingml/2006/main" xmlns:r="http://schemas.openxmlformats.org/officeDocument/2006/relationships" xmlns:p="http://schemas.openxmlformats.org/presentationml/2006/main">
+  <p:cSld>
+    <p:bg>
+      <p:bgPr>
+        <a:solidFill>
+          <a:schemeClr val="bg2"/>
+        </a:solidFill>
+        <a:effectLst/>
+      </p:bgPr>
+    </p:bg>
+    <p:spTree>
+      <p:nvGrpSpPr>
+        <p:cNvPr id="1" name=""/>
+        <p:cNvGrpSpPr/>
+        <p:nvPr/>
+      </p:nvGrpSpPr>
+      <p:grpSpPr>
+        <a:xfrm>
+          <a:off x="0" y="0"/>
+          <a:ext cx="0" cy="0"/>
+          <a:chOff x="0" y="0"/>
+          <a:chExt cx="0" cy="0"/>
+        </a:xfrm>
+      </p:grpSpPr>
+      <p:sp>
+        <p:nvSpPr>
+          <p:cNvPr id="2052" name="Rectangle 134">
+            <a:extLst>
+              <a:ext uri="{FF2B5EF4-FFF2-40B4-BE49-F238E27FC236}">
+                <a16:creationId xmlns:a16="http://schemas.microsoft.com/office/drawing/2014/main" id="{9F8240C3-AA7A-4675-B08A-687C8BF5D5B1}"/>
+              </a:ext>
+              <a:ext uri="{C183D7F6-B498-43B3-948B-1728B52AA6E4}">
+                <adec:decorative xmlns:adec="http://schemas.microsoft.com/office/drawing/2017/decorative" val="1"/>
+              </a:ext>
+            </a:extLst>
+          </p:cNvPr>
+          <p:cNvSpPr>
+            <a:spLocks noGrp="1" noRot="1" noChangeAspect="1" noMove="1" noResize="1" noEditPoints="1" noAdjustHandles="1" noChangeArrowheads="1" noChangeShapeType="1" noTextEdit="1"/>
+          </p:cNvSpPr>
+          <p:nvPr>
+            <p:extLst>
+              <p:ext uri="{386F3935-93C4-4BCD-93E2-E3B085C9AB24}">
+                <p16:designElem xmlns:p16="http://schemas.microsoft.com/office/powerpoint/2015/main" val="1"/>
+              </p:ext>
+            </p:extLst>
+          </p:nvPr>
+        </p:nvSpPr>
+        <p:spPr>
+          <a:xfrm>
+            <a:off x="0" y="0"/>
+            <a:ext cx="12192000" cy="6858000"/>
+          </a:xfrm>
+          <a:prstGeom prst="rect">
+            <a:avLst/>
+          </a:prstGeom>
+          <a:solidFill>
+            <a:schemeClr val="bg1">
+              <a:lumMod val="75000"/>
+            </a:schemeClr>
+          </a:solidFill>
+          <a:ln>
+            <a:noFill/>
+          </a:ln>
+        </p:spPr>
+        <p:style>
+          <a:lnRef idx="2">
+            <a:schemeClr val="accent1">
+              <a:shade val="50000"/>
+            </a:schemeClr>
+          </a:lnRef>
+          <a:fillRef idx="1">
+            <a:schemeClr val="accent1"/>
+          </a:fillRef>
+          <a:effectRef idx="0">
+            <a:schemeClr val="accent1"/>
+          </a:effectRef>
+          <a:fontRef idx="minor">
+            <a:schemeClr val="lt1"/>
+          </a:fontRef>
+        </p:style>
+        <p:txBody>
+          <a:bodyPr rtlCol="0" anchor="ctr"/>
+          <a:lstStyle/>
+          <a:p>
+            <a:pPr algn="ctr"/>
+            <a:endParaRPr lang="en-US"/>
+          </a:p>
+        </p:txBody>
+      </p:sp>
+      <p:sp>
+        <p:nvSpPr>
+          <p:cNvPr id="2053" name="Rectangle 136">
+            <a:extLst>
+              <a:ext uri="{FF2B5EF4-FFF2-40B4-BE49-F238E27FC236}">
+                <a16:creationId xmlns:a16="http://schemas.microsoft.com/office/drawing/2014/main" id="{B98FE5FF-6839-4B2B-BA4F-78C87E8EDE43}"/>
+              </a:ext>
+              <a:ext uri="{C183D7F6-B498-43B3-948B-1728B52AA6E4}">
+                <adec:decorative xmlns:adec="http://schemas.microsoft.com/office/drawing/2017/decorative" val="1"/>
+              </a:ext>
+            </a:extLst>
+          </p:cNvPr>
+          <p:cNvSpPr>
+            <a:spLocks noGrp="1" noRot="1" noChangeAspect="1" noMove="1" noResize="1" noEditPoints="1" noAdjustHandles="1" noChangeArrowheads="1" noChangeShapeType="1" noTextEdit="1"/>
+          </p:cNvSpPr>
+          <p:nvPr>
+            <p:extLst>
+              <p:ext uri="{386F3935-93C4-4BCD-93E2-E3B085C9AB24}">
+                <p16:designElem xmlns:p16="http://schemas.microsoft.com/office/powerpoint/2015/main" val="1"/>
+              </p:ext>
+            </p:extLst>
+          </p:nvPr>
+        </p:nvSpPr>
+        <p:spPr>
+          <a:xfrm>
+            <a:off x="477012" y="480060"/>
+            <a:ext cx="11237976" cy="5897880"/>
+          </a:xfrm>
+          <a:prstGeom prst="rect">
+            <a:avLst/>
+          </a:prstGeom>
+          <a:noFill/>
+          <a:ln>
+            <a:solidFill>
+              <a:schemeClr val="bg1"/>
+            </a:solidFill>
+          </a:ln>
+        </p:spPr>
+        <p:style>
+          <a:lnRef idx="2">
+            <a:schemeClr val="accent1">
+              <a:shade val="50000"/>
+            </a:schemeClr>
+          </a:lnRef>
+          <a:fillRef idx="1">
+            <a:schemeClr val="accent1"/>
+          </a:fillRef>
+          <a:effectRef idx="0">
+            <a:schemeClr val="accent1"/>
+          </a:effectRef>
+          <a:fontRef idx="minor">
+            <a:schemeClr val="lt1"/>
+          </a:fontRef>
+        </p:style>
+        <p:txBody>
+          <a:bodyPr rtlCol="0" anchor="ctr"/>
+          <a:lstStyle/>
+          <a:p>
+            <a:pPr algn="ctr"/>
+            <a:endParaRPr lang="en-US"/>
+          </a:p>
+        </p:txBody>
+      </p:sp>
+      <p:sp>
+        <p:nvSpPr>
+          <p:cNvPr id="139" name="Rectangle 138">
+            <a:extLst>
+              <a:ext uri="{FF2B5EF4-FFF2-40B4-BE49-F238E27FC236}">
+                <a16:creationId xmlns:a16="http://schemas.microsoft.com/office/drawing/2014/main" id="{D17E82A2-6E5A-4DC5-921D-8ABC19E53E18}"/>
+              </a:ext>
+              <a:ext uri="{C183D7F6-B498-43B3-948B-1728B52AA6E4}">
+                <adec:decorative xmlns:adec="http://schemas.microsoft.com/office/drawing/2017/decorative" val="1"/>
+              </a:ext>
+            </a:extLst>
+          </p:cNvPr>
+          <p:cNvSpPr>
+            <a:spLocks noGrp="1" noRot="1" noChangeAspect="1" noMove="1" noResize="1" noEditPoints="1" noAdjustHandles="1" noChangeArrowheads="1" noChangeShapeType="1" noTextEdit="1"/>
+          </p:cNvSpPr>
+          <p:nvPr>
+            <p:extLst>
+              <p:ext uri="{386F3935-93C4-4BCD-93E2-E3B085C9AB24}">
+                <p16:designElem xmlns:p16="http://schemas.microsoft.com/office/powerpoint/2015/main" val="1"/>
+              </p:ext>
+            </p:extLst>
+          </p:nvPr>
+        </p:nvSpPr>
+        <p:spPr>
+          <a:xfrm>
+            <a:off x="643466" y="643468"/>
+            <a:ext cx="10905067" cy="5571066"/>
+          </a:xfrm>
+          <a:prstGeom prst="rect">
+            <a:avLst/>
+          </a:prstGeom>
+          <a:solidFill>
+            <a:srgbClr val="FFFFFF"/>
+          </a:solidFill>
+          <a:ln>
+            <a:noFill/>
+          </a:ln>
+        </p:spPr>
+        <p:style>
+          <a:lnRef idx="2">
+            <a:schemeClr val="accent1">
+              <a:shade val="50000"/>
+            </a:schemeClr>
+          </a:lnRef>
+          <a:fillRef idx="1">
+            <a:schemeClr val="accent1"/>
+          </a:fillRef>
+          <a:effectRef idx="0">
+            <a:schemeClr val="accent1"/>
+          </a:effectRef>
+          <a:fontRef idx="minor">
+            <a:schemeClr val="lt1"/>
+          </a:fontRef>
+        </p:style>
+        <p:txBody>
+          <a:bodyPr rtlCol="0" anchor="ctr"/>
+          <a:lstStyle/>
+          <a:p>
+            <a:pPr algn="ctr"/>
+            <a:endParaRPr lang="en-US"/>
+          </a:p>
+        </p:txBody>
+      </p:sp>
+      <p:pic>
+        <p:nvPicPr>
+          <p:cNvPr id="2050" name="Picture 2" descr="Publishing Industry Trends in 7 Charts - Submittable Blog">
+            <a:extLst>
+              <a:ext uri="{FF2B5EF4-FFF2-40B4-BE49-F238E27FC236}">
+                <a16:creationId xmlns:a16="http://schemas.microsoft.com/office/drawing/2014/main" id="{0D67CB9F-7018-4E6E-817A-3ECA59D4C265}"/>
+              </a:ext>
+            </a:extLst>
+          </p:cNvPr>
+          <p:cNvPicPr>
+            <a:picLocks noChangeAspect="1" noChangeArrowheads="1"/>
+          </p:cNvPicPr>
+          <p:nvPr/>
+        </p:nvPicPr>
+        <p:blipFill>
+          <a:blip r:embed="rId2">
+            <a:extLst>
+              <a:ext uri="{28A0092B-C50C-407E-A947-70E740481C1C}">
+                <a14:useLocalDpi xmlns:a14="http://schemas.microsoft.com/office/drawing/2010/main" val="0"/>
+              </a:ext>
+            </a:extLst>
+          </a:blip>
+          <a:stretch>
+            <a:fillRect/>
+          </a:stretch>
+        </p:blipFill>
+        <p:spPr bwMode="auto">
+          <a:xfrm>
+            <a:off x="2210090" y="1123527"/>
+            <a:ext cx="7771814" cy="4604800"/>
+          </a:xfrm>
+          <a:prstGeom prst="rect">
+            <a:avLst/>
+          </a:prstGeom>
+          <a:noFill/>
+          <a:extLst>
+            <a:ext uri="{909E8E84-426E-40DD-AFC4-6F175D3DCCD1}">
+              <a14:hiddenFill xmlns:a14="http://schemas.microsoft.com/office/drawing/2010/main">
+                <a:solidFill>
+                  <a:srgbClr val="FFFFFF"/>
+                </a:solidFill>
+              </a14:hiddenFill>
+            </a:ext>
+          </a:extLst>
+        </p:spPr>
+      </p:pic>
+    </p:spTree>
+    <p:extLst>
+      <p:ext uri="{BB962C8B-B14F-4D97-AF65-F5344CB8AC3E}">
+        <p14:creationId xmlns:p14="http://schemas.microsoft.com/office/powerpoint/2010/main" val="2690005690"/>
+      </p:ext>
+    </p:extLst>
+  </p:cSld>
+  <p:clrMapOvr>
+    <a:masterClrMapping/>
+  </p:clrMapOvr>
+</p:sld>
+</file>
+
+<file path=ppt/slides/slide5.xml><?xml version="1.0" encoding="utf-8"?>
+<p:sld xmlns:a="http://schemas.openxmlformats.org/drawingml/2006/main" xmlns:r="http://schemas.openxmlformats.org/officeDocument/2006/relationships" xmlns:p="http://schemas.openxmlformats.org/presentationml/2006/main">
+  <p:cSld>
+    <p:bg>
+      <p:bgPr>
+        <a:solidFill>
           <a:schemeClr val="bg1">
             <a:tint val="95000"/>
             <a:satMod val="170000"/>
@@ -12134,7 +14104,7 @@
 </p:sld>
 </file>
 
-<file path=ppt/slides/slide4.xml><?xml version="1.0" encoding="utf-8"?>
+<file path=ppt/slides/slide6.xml><?xml version="1.0" encoding="utf-8"?>
 <p:sld xmlns:a="http://schemas.openxmlformats.org/drawingml/2006/main" xmlns:r="http://schemas.openxmlformats.org/officeDocument/2006/relationships" xmlns:p="http://schemas.openxmlformats.org/presentationml/2006/main">
   <p:cSld>
     <p:spTree>
@@ -12217,7 +14187,7 @@
 </p:sld>
 </file>
 
-<file path=ppt/slides/slide5.xml><?xml version="1.0" encoding="utf-8"?>
+<file path=ppt/slides/slide7.xml><?xml version="1.0" encoding="utf-8"?>
 <p:sld xmlns:a="http://schemas.openxmlformats.org/drawingml/2006/main" xmlns:r="http://schemas.openxmlformats.org/officeDocument/2006/relationships" xmlns:p="http://schemas.openxmlformats.org/presentationml/2006/main">
   <p:cSld>
     <p:spTree>
@@ -12364,7 +14334,7 @@
 </p:sld>
 </file>
 
-<file path=ppt/slides/slide6.xml><?xml version="1.0" encoding="utf-8"?>
+<file path=ppt/slides/slide8.xml><?xml version="1.0" encoding="utf-8"?>
 <p:sld xmlns:a="http://schemas.openxmlformats.org/drawingml/2006/main" xmlns:r="http://schemas.openxmlformats.org/officeDocument/2006/relationships" xmlns:p="http://schemas.openxmlformats.org/presentationml/2006/main">
   <p:cSld>
     <p:bg>
@@ -12755,7 +14725,7 @@
 </p:sld>
 </file>
 
-<file path=ppt/slides/slide7.xml><?xml version="1.0" encoding="utf-8"?>
+<file path=ppt/slides/slide9.xml><?xml version="1.0" encoding="utf-8"?>
 <p:sld xmlns:a="http://schemas.openxmlformats.org/drawingml/2006/main" xmlns:r="http://schemas.openxmlformats.org/officeDocument/2006/relationships" xmlns:p="http://schemas.openxmlformats.org/presentationml/2006/main">
   <p:cSld>
     <p:bg>
@@ -12850,599 +14820,6 @@
     <p:extLst>
       <p:ext uri="{BB962C8B-B14F-4D97-AF65-F5344CB8AC3E}">
         <p14:creationId xmlns:p14="http://schemas.microsoft.com/office/powerpoint/2010/main" val="1502875640"/>
-      </p:ext>
-    </p:extLst>
-  </p:cSld>
-  <p:clrMapOvr>
-    <a:masterClrMapping/>
-  </p:clrMapOvr>
-</p:sld>
-</file>
-
-<file path=ppt/slides/slide8.xml><?xml version="1.0" encoding="utf-8"?>
-<p:sld xmlns:a="http://schemas.openxmlformats.org/drawingml/2006/main" xmlns:r="http://schemas.openxmlformats.org/officeDocument/2006/relationships" xmlns:p="http://schemas.openxmlformats.org/presentationml/2006/main">
-  <p:cSld>
-    <p:spTree>
-      <p:nvGrpSpPr>
-        <p:cNvPr id="1" name=""/>
-        <p:cNvGrpSpPr/>
-        <p:nvPr/>
-      </p:nvGrpSpPr>
-      <p:grpSpPr>
-        <a:xfrm>
-          <a:off x="0" y="0"/>
-          <a:ext cx="0" cy="0"/>
-          <a:chOff x="0" y="0"/>
-          <a:chExt cx="0" cy="0"/>
-        </a:xfrm>
-      </p:grpSpPr>
-      <p:sp>
-        <p:nvSpPr>
-          <p:cNvPr id="2" name="Title 1">
-            <a:extLst>
-              <a:ext uri="{FF2B5EF4-FFF2-40B4-BE49-F238E27FC236}">
-                <a16:creationId xmlns:a16="http://schemas.microsoft.com/office/drawing/2014/main" id="{C7600063-9854-4256-A64F-465ACA8ACDDC}"/>
-              </a:ext>
-            </a:extLst>
-          </p:cNvPr>
-          <p:cNvSpPr>
-            <a:spLocks noGrp="1"/>
-          </p:cNvSpPr>
-          <p:nvPr>
-            <p:ph type="title"/>
-          </p:nvPr>
-        </p:nvSpPr>
-        <p:spPr/>
-        <p:txBody>
-          <a:bodyPr/>
-          <a:lstStyle/>
-          <a:p>
-            <a:r>
-              <a:rPr lang="en-US" dirty="0"/>
-              <a:t>Project challenges</a:t>
-            </a:r>
-          </a:p>
-        </p:txBody>
-      </p:sp>
-      <p:sp>
-        <p:nvSpPr>
-          <p:cNvPr id="3" name="Text Placeholder 2">
-            <a:extLst>
-              <a:ext uri="{FF2B5EF4-FFF2-40B4-BE49-F238E27FC236}">
-                <a16:creationId xmlns:a16="http://schemas.microsoft.com/office/drawing/2014/main" id="{8A5A7F28-4333-4449-9EB2-D5249836DE9F}"/>
-              </a:ext>
-            </a:extLst>
-          </p:cNvPr>
-          <p:cNvSpPr>
-            <a:spLocks noGrp="1"/>
-          </p:cNvSpPr>
-          <p:nvPr>
-            <p:ph type="body" idx="1"/>
-          </p:nvPr>
-        </p:nvSpPr>
-        <p:spPr/>
-        <p:txBody>
-          <a:bodyPr/>
-          <a:lstStyle/>
-          <a:p>
-            <a:endParaRPr lang="en-US"/>
-          </a:p>
-        </p:txBody>
-      </p:sp>
-    </p:spTree>
-    <p:extLst>
-      <p:ext uri="{BB962C8B-B14F-4D97-AF65-F5344CB8AC3E}">
-        <p14:creationId xmlns:p14="http://schemas.microsoft.com/office/powerpoint/2010/main" val="1096313556"/>
-      </p:ext>
-    </p:extLst>
-  </p:cSld>
-  <p:clrMapOvr>
-    <a:masterClrMapping/>
-  </p:clrMapOvr>
-</p:sld>
-</file>
-
-<file path=ppt/slides/slide9.xml><?xml version="1.0" encoding="utf-8"?>
-<p:sld xmlns:a="http://schemas.openxmlformats.org/drawingml/2006/main" xmlns:r="http://schemas.openxmlformats.org/officeDocument/2006/relationships" xmlns:p="http://schemas.openxmlformats.org/presentationml/2006/main">
-  <p:cSld>
-    <p:bg>
-      <p:bgPr>
-        <a:solidFill>
-          <a:schemeClr val="bg2"/>
-        </a:solidFill>
-        <a:effectLst/>
-      </p:bgPr>
-    </p:bg>
-    <p:spTree>
-      <p:nvGrpSpPr>
-        <p:cNvPr id="1" name=""/>
-        <p:cNvGrpSpPr/>
-        <p:nvPr/>
-      </p:nvGrpSpPr>
-      <p:grpSpPr>
-        <a:xfrm>
-          <a:off x="0" y="0"/>
-          <a:ext cx="0" cy="0"/>
-          <a:chOff x="0" y="0"/>
-          <a:chExt cx="0" cy="0"/>
-        </a:xfrm>
-      </p:grpSpPr>
-      <p:grpSp>
-        <p:nvGrpSpPr>
-          <p:cNvPr id="71" name="Group 70">
-            <a:extLst>
-              <a:ext uri="{FF2B5EF4-FFF2-40B4-BE49-F238E27FC236}">
-                <a16:creationId xmlns:a16="http://schemas.microsoft.com/office/drawing/2014/main" id="{449BC34D-9C23-4D6D-8213-1F471AF85B3F}"/>
-              </a:ext>
-              <a:ext uri="{C183D7F6-B498-43B3-948B-1728B52AA6E4}">
-                <adec:decorative xmlns:adec="http://schemas.microsoft.com/office/drawing/2017/decorative" val="1"/>
-              </a:ext>
-            </a:extLst>
-          </p:cNvPr>
-          <p:cNvGrpSpPr>
-            <a:grpSpLocks noGrp="1" noUngrp="1" noRot="1" noChangeAspect="1" noMove="1" noResize="1"/>
-          </p:cNvGrpSpPr>
-          <p:nvPr>
-            <p:extLst>
-              <p:ext uri="{386F3935-93C4-4BCD-93E2-E3B085C9AB24}">
-                <p16:designElem xmlns:p16="http://schemas.microsoft.com/office/powerpoint/2015/main" val="1"/>
-              </p:ext>
-            </p:extLst>
-          </p:nvPr>
-        </p:nvGrpSpPr>
-        <p:grpSpPr>
-          <a:xfrm>
-            <a:off x="752858" y="744469"/>
-            <a:ext cx="10674117" cy="5349671"/>
-            <a:chOff x="752858" y="744469"/>
-            <a:chExt cx="10674117" cy="5349671"/>
-          </a:xfrm>
-        </p:grpSpPr>
-        <p:sp>
-          <p:nvSpPr>
-            <p:cNvPr id="72" name="Freeform 6">
-              <a:extLst>
-                <a:ext uri="{FF2B5EF4-FFF2-40B4-BE49-F238E27FC236}">
-                  <a16:creationId xmlns:a16="http://schemas.microsoft.com/office/drawing/2014/main" id="{FA0F5D6C-5025-4D7E-82DD-C2C6FDA1E759}"/>
-                </a:ext>
-                <a:ext uri="{C183D7F6-B498-43B3-948B-1728B52AA6E4}">
-                  <adec:decorative xmlns:adec="http://schemas.microsoft.com/office/drawing/2017/decorative" val="1"/>
-                </a:ext>
-              </a:extLst>
-            </p:cNvPr>
-            <p:cNvSpPr/>
-            <p:nvPr>
-              <p:extLst>
-                <p:ext uri="{386F3935-93C4-4BCD-93E2-E3B085C9AB24}">
-                  <p16:designElem xmlns:p16="http://schemas.microsoft.com/office/powerpoint/2015/main" val="1"/>
-                </p:ext>
-              </p:extLst>
-            </p:nvPr>
-          </p:nvSpPr>
-          <p:spPr bwMode="auto">
-            <a:xfrm>
-              <a:off x="8151962" y="1685652"/>
-              <a:ext cx="3275013" cy="4408488"/>
-            </a:xfrm>
-            <a:custGeom>
-              <a:avLst/>
-              <a:gdLst/>
-              <a:ahLst/>
-              <a:cxnLst/>
-              <a:rect l="l" t="t" r="r" b="b"/>
-              <a:pathLst>
-                <a:path w="10000" h="10000">
-                  <a:moveTo>
-                    <a:pt x="8761" y="0"/>
-                  </a:moveTo>
-                  <a:lnTo>
-                    <a:pt x="10000" y="0"/>
-                  </a:lnTo>
-                  <a:lnTo>
-                    <a:pt x="10000" y="10000"/>
-                  </a:lnTo>
-                  <a:lnTo>
-                    <a:pt x="0" y="10000"/>
-                  </a:lnTo>
-                  <a:lnTo>
-                    <a:pt x="0" y="9126"/>
-                  </a:lnTo>
-                  <a:lnTo>
-                    <a:pt x="8761" y="9127"/>
-                  </a:lnTo>
-                  <a:lnTo>
-                    <a:pt x="8761" y="0"/>
-                  </a:lnTo>
-                  <a:close/>
-                </a:path>
-              </a:pathLst>
-            </a:custGeom>
-            <a:solidFill>
-              <a:schemeClr val="tx2"/>
-            </a:solidFill>
-            <a:ln w="0">
-              <a:noFill/>
-              <a:prstDash val="solid"/>
-              <a:round/>
-              <a:headEnd/>
-              <a:tailEnd/>
-            </a:ln>
-          </p:spPr>
-        </p:sp>
-        <p:sp>
-          <p:nvSpPr>
-            <p:cNvPr id="73" name="Freeform 6">
-              <a:extLst>
-                <a:ext uri="{FF2B5EF4-FFF2-40B4-BE49-F238E27FC236}">
-                  <a16:creationId xmlns:a16="http://schemas.microsoft.com/office/drawing/2014/main" id="{E2AF2C17-4AB4-4402-B84B-129EF95D161C}"/>
-                </a:ext>
-                <a:ext uri="{C183D7F6-B498-43B3-948B-1728B52AA6E4}">
-                  <adec:decorative xmlns:adec="http://schemas.microsoft.com/office/drawing/2017/decorative" val="1"/>
-                </a:ext>
-              </a:extLst>
-            </p:cNvPr>
-            <p:cNvSpPr/>
-            <p:nvPr>
-              <p:extLst>
-                <p:ext uri="{386F3935-93C4-4BCD-93E2-E3B085C9AB24}">
-                  <p16:designElem xmlns:p16="http://schemas.microsoft.com/office/powerpoint/2015/main" val="1"/>
-                </p:ext>
-              </p:extLst>
-            </p:nvPr>
-          </p:nvSpPr>
-          <p:spPr bwMode="auto">
-            <a:xfrm flipH="1" flipV="1">
-              <a:off x="752858" y="744469"/>
-              <a:ext cx="3275668" cy="4408488"/>
-            </a:xfrm>
-            <a:custGeom>
-              <a:avLst/>
-              <a:gdLst/>
-              <a:ahLst/>
-              <a:cxnLst/>
-              <a:rect l="l" t="t" r="r" b="b"/>
-              <a:pathLst>
-                <a:path w="10002" h="10000">
-                  <a:moveTo>
-                    <a:pt x="8763" y="0"/>
-                  </a:moveTo>
-                  <a:lnTo>
-                    <a:pt x="10002" y="0"/>
-                  </a:lnTo>
-                  <a:lnTo>
-                    <a:pt x="10002" y="10000"/>
-                  </a:lnTo>
-                  <a:lnTo>
-                    <a:pt x="2" y="10000"/>
-                  </a:lnTo>
-                  <a:cubicBezTo>
-                    <a:pt x="-2" y="9698"/>
-                    <a:pt x="4" y="9427"/>
-                    <a:pt x="0" y="9125"/>
-                  </a:cubicBezTo>
-                  <a:lnTo>
-                    <a:pt x="8763" y="9128"/>
-                  </a:lnTo>
-                  <a:lnTo>
-                    <a:pt x="8763" y="0"/>
-                  </a:lnTo>
-                  <a:close/>
-                </a:path>
-              </a:pathLst>
-            </a:custGeom>
-            <a:solidFill>
-              <a:schemeClr val="tx2"/>
-            </a:solidFill>
-            <a:ln w="0">
-              <a:noFill/>
-              <a:prstDash val="solid"/>
-              <a:round/>
-              <a:headEnd/>
-              <a:tailEnd/>
-            </a:ln>
-          </p:spPr>
-        </p:sp>
-      </p:grpSp>
-      <p:sp useBgFill="1">
-        <p:nvSpPr>
-          <p:cNvPr id="75" name="Rectangle 74">
-            <a:extLst>
-              <a:ext uri="{FF2B5EF4-FFF2-40B4-BE49-F238E27FC236}">
-                <a16:creationId xmlns:a16="http://schemas.microsoft.com/office/drawing/2014/main" id="{1F9A0C1C-8ABC-401B-8FE9-AC9327C4C587}"/>
-              </a:ext>
-              <a:ext uri="{C183D7F6-B498-43B3-948B-1728B52AA6E4}">
-                <adec:decorative xmlns:adec="http://schemas.microsoft.com/office/drawing/2017/decorative" val="1"/>
-              </a:ext>
-            </a:extLst>
-          </p:cNvPr>
-          <p:cNvSpPr>
-            <a:spLocks noGrp="1" noRot="1" noChangeAspect="1" noMove="1" noResize="1" noEditPoints="1" noAdjustHandles="1" noChangeArrowheads="1" noChangeShapeType="1" noTextEdit="1"/>
-          </p:cNvSpPr>
-          <p:nvPr>
-            <p:extLst>
-              <p:ext uri="{386F3935-93C4-4BCD-93E2-E3B085C9AB24}">
-                <p16:designElem xmlns:p16="http://schemas.microsoft.com/office/powerpoint/2015/main" val="1"/>
-              </p:ext>
-            </p:extLst>
-          </p:nvPr>
-        </p:nvSpPr>
-        <p:spPr>
-          <a:xfrm>
-            <a:off x="0" y="0"/>
-            <a:ext cx="12192000" cy="6858000"/>
-          </a:xfrm>
-          <a:prstGeom prst="rect">
-            <a:avLst/>
-          </a:prstGeom>
-          <a:ln>
-            <a:noFill/>
-          </a:ln>
-        </p:spPr>
-        <p:style>
-          <a:lnRef idx="2">
-            <a:schemeClr val="accent1">
-              <a:shade val="50000"/>
-            </a:schemeClr>
-          </a:lnRef>
-          <a:fillRef idx="1001">
-            <a:schemeClr val="lt2"/>
-          </a:fillRef>
-          <a:effectRef idx="0">
-            <a:schemeClr val="accent1"/>
-          </a:effectRef>
-          <a:fontRef idx="minor">
-            <a:schemeClr val="lt1"/>
-          </a:fontRef>
-        </p:style>
-        <p:txBody>
-          <a:bodyPr rtlCol="0" anchor="ctr"/>
-          <a:lstStyle/>
-          <a:p>
-            <a:pPr algn="ctr"/>
-            <a:endParaRPr lang="en-US"/>
-          </a:p>
-        </p:txBody>
-      </p:sp>
-      <p:sp>
-        <p:nvSpPr>
-          <p:cNvPr id="2" name="Title 1">
-            <a:extLst>
-              <a:ext uri="{FF2B5EF4-FFF2-40B4-BE49-F238E27FC236}">
-                <a16:creationId xmlns:a16="http://schemas.microsoft.com/office/drawing/2014/main" id="{31BC3835-2F1E-490F-889F-A96F74A6FB9F}"/>
-              </a:ext>
-            </a:extLst>
-          </p:cNvPr>
-          <p:cNvSpPr>
-            <a:spLocks noGrp="1"/>
-          </p:cNvSpPr>
-          <p:nvPr>
-            <p:ph type="title"/>
-          </p:nvPr>
-        </p:nvSpPr>
-        <p:spPr>
-          <a:xfrm>
-            <a:off x="8154186" y="634028"/>
-            <a:ext cx="3355942" cy="3732835"/>
-          </a:xfrm>
-        </p:spPr>
-        <p:txBody>
-          <a:bodyPr vert="horz" lIns="91440" tIns="45720" rIns="91440" bIns="45720" rtlCol="0" anchor="b">
-            <a:normAutofit/>
-          </a:bodyPr>
-          <a:lstStyle/>
-          <a:p>
-            <a:pPr algn="ctr">
-              <a:lnSpc>
-                <a:spcPct val="89000"/>
-              </a:lnSpc>
-            </a:pPr>
-            <a:r>
-              <a:rPr lang="en-US" sz="4700" cap="all"/>
-              <a:t>What Objectives are needed ?</a:t>
-            </a:r>
-          </a:p>
-        </p:txBody>
-      </p:sp>
-      <p:sp>
-        <p:nvSpPr>
-          <p:cNvPr id="77" name="Freeform 6">
-            <a:extLst>
-              <a:ext uri="{FF2B5EF4-FFF2-40B4-BE49-F238E27FC236}">
-                <a16:creationId xmlns:a16="http://schemas.microsoft.com/office/drawing/2014/main" id="{BA5783C3-2F96-40A7-A24F-30CB07AA3928}"/>
-              </a:ext>
-              <a:ext uri="{C183D7F6-B498-43B3-948B-1728B52AA6E4}">
-                <adec:decorative xmlns:adec="http://schemas.microsoft.com/office/drawing/2017/decorative" val="1"/>
-              </a:ext>
-            </a:extLst>
-          </p:cNvPr>
-          <p:cNvSpPr>
-            <a:spLocks noGrp="1" noRot="1" noChangeAspect="1" noMove="1" noResize="1" noEditPoints="1" noAdjustHandles="1" noChangeArrowheads="1" noChangeShapeType="1" noTextEdit="1"/>
-          </p:cNvSpPr>
-          <p:nvPr>
-            <p:extLst>
-              <p:ext uri="{386F3935-93C4-4BCD-93E2-E3B085C9AB24}">
-                <p16:designElem xmlns:p16="http://schemas.microsoft.com/office/powerpoint/2015/main" val="1"/>
-              </p:ext>
-            </p:extLst>
-          </p:nvPr>
-        </p:nvSpPr>
-        <p:spPr bwMode="auto">
-          <a:xfrm flipH="1" flipV="1">
-            <a:off x="649163" y="634028"/>
-            <a:ext cx="3275668" cy="4408488"/>
-          </a:xfrm>
-          <a:custGeom>
-            <a:avLst/>
-            <a:gdLst/>
-            <a:ahLst/>
-            <a:cxnLst/>
-            <a:rect l="l" t="t" r="r" b="b"/>
-            <a:pathLst>
-              <a:path w="10002" h="10000">
-                <a:moveTo>
-                  <a:pt x="8763" y="0"/>
-                </a:moveTo>
-                <a:lnTo>
-                  <a:pt x="10002" y="0"/>
-                </a:lnTo>
-                <a:lnTo>
-                  <a:pt x="10002" y="10000"/>
-                </a:lnTo>
-                <a:lnTo>
-                  <a:pt x="2" y="10000"/>
-                </a:lnTo>
-                <a:cubicBezTo>
-                  <a:pt x="-2" y="9698"/>
-                  <a:pt x="4" y="9427"/>
-                  <a:pt x="0" y="9125"/>
-                </a:cubicBezTo>
-                <a:lnTo>
-                  <a:pt x="8763" y="9128"/>
-                </a:lnTo>
-                <a:lnTo>
-                  <a:pt x="8763" y="0"/>
-                </a:lnTo>
-                <a:close/>
-              </a:path>
-            </a:pathLst>
-          </a:custGeom>
-          <a:solidFill>
-            <a:schemeClr val="tx2"/>
-          </a:solidFill>
-          <a:ln w="0">
-            <a:noFill/>
-            <a:prstDash val="solid"/>
-            <a:round/>
-            <a:headEnd/>
-            <a:tailEnd/>
-          </a:ln>
-        </p:spPr>
-      </p:sp>
-      <p:sp>
-        <p:nvSpPr>
-          <p:cNvPr id="79" name="Freeform 6">
-            <a:extLst>
-              <a:ext uri="{FF2B5EF4-FFF2-40B4-BE49-F238E27FC236}">
-                <a16:creationId xmlns:a16="http://schemas.microsoft.com/office/drawing/2014/main" id="{A9D08DBA-0326-4C4E-ACFB-576F3ABDD2D0}"/>
-              </a:ext>
-              <a:ext uri="{C183D7F6-B498-43B3-948B-1728B52AA6E4}">
-                <adec:decorative xmlns:adec="http://schemas.microsoft.com/office/drawing/2017/decorative" val="1"/>
-              </a:ext>
-            </a:extLst>
-          </p:cNvPr>
-          <p:cNvSpPr>
-            <a:spLocks noGrp="1" noRot="1" noChangeAspect="1" noMove="1" noResize="1" noEditPoints="1" noAdjustHandles="1" noChangeArrowheads="1" noChangeShapeType="1" noTextEdit="1"/>
-          </p:cNvSpPr>
-          <p:nvPr>
-            <p:extLst>
-              <p:ext uri="{386F3935-93C4-4BCD-93E2-E3B085C9AB24}">
-                <p16:designElem xmlns:p16="http://schemas.microsoft.com/office/powerpoint/2015/main" val="1"/>
-              </p:ext>
-            </p:extLst>
-          </p:nvPr>
-        </p:nvSpPr>
-        <p:spPr bwMode="auto">
-          <a:xfrm>
-            <a:off x="4494670" y="2016617"/>
-            <a:ext cx="3275013" cy="4408488"/>
-          </a:xfrm>
-          <a:custGeom>
-            <a:avLst/>
-            <a:gdLst/>
-            <a:ahLst/>
-            <a:cxnLst/>
-            <a:rect l="l" t="t" r="r" b="b"/>
-            <a:pathLst>
-              <a:path w="10000" h="10000">
-                <a:moveTo>
-                  <a:pt x="8761" y="0"/>
-                </a:moveTo>
-                <a:lnTo>
-                  <a:pt x="10000" y="0"/>
-                </a:lnTo>
-                <a:lnTo>
-                  <a:pt x="10000" y="10000"/>
-                </a:lnTo>
-                <a:lnTo>
-                  <a:pt x="0" y="10000"/>
-                </a:lnTo>
-                <a:lnTo>
-                  <a:pt x="0" y="9126"/>
-                </a:lnTo>
-                <a:lnTo>
-                  <a:pt x="8761" y="9127"/>
-                </a:lnTo>
-                <a:lnTo>
-                  <a:pt x="8761" y="0"/>
-                </a:lnTo>
-                <a:close/>
-              </a:path>
-            </a:pathLst>
-          </a:custGeom>
-          <a:solidFill>
-            <a:schemeClr val="tx2"/>
-          </a:solidFill>
-          <a:ln w="0">
-            <a:noFill/>
-            <a:prstDash val="solid"/>
-            <a:round/>
-            <a:headEnd/>
-            <a:tailEnd/>
-          </a:ln>
-        </p:spPr>
-      </p:sp>
-      <p:pic>
-        <p:nvPicPr>
-          <p:cNvPr id="2050" name="Picture 2" descr="8. Define System Requirements | CRVS Digitisation Guidebook">
-            <a:extLst>
-              <a:ext uri="{FF2B5EF4-FFF2-40B4-BE49-F238E27FC236}">
-                <a16:creationId xmlns:a16="http://schemas.microsoft.com/office/drawing/2014/main" id="{F0840090-8DC3-4AC7-8921-5A9273062276}"/>
-              </a:ext>
-            </a:extLst>
-          </p:cNvPr>
-          <p:cNvPicPr>
-            <a:picLocks noGrp="1" noChangeAspect="1" noChangeArrowheads="1"/>
-          </p:cNvPicPr>
-          <p:nvPr>
-            <p:ph idx="1"/>
-          </p:nvPr>
-        </p:nvPicPr>
-        <p:blipFill>
-          <a:blip r:embed="rId2">
-            <a:extLst>
-              <a:ext uri="{28A0092B-C50C-407E-A947-70E740481C1C}">
-                <a14:useLocalDpi xmlns:a14="http://schemas.microsoft.com/office/drawing/2010/main" val="0"/>
-              </a:ext>
-            </a:extLst>
-          </a:blip>
-          <a:stretch>
-            <a:fillRect/>
-          </a:stretch>
-        </p:blipFill>
-        <p:spPr bwMode="auto">
-          <a:xfrm>
-            <a:off x="1379023" y="2212827"/>
-            <a:ext cx="5659222" cy="2631537"/>
-          </a:xfrm>
-          <a:prstGeom prst="rect">
-            <a:avLst/>
-          </a:prstGeom>
-          <a:noFill/>
-          <a:extLst>
-            <a:ext uri="{909E8E84-426E-40DD-AFC4-6F175D3DCCD1}">
-              <a14:hiddenFill xmlns:a14="http://schemas.microsoft.com/office/drawing/2010/main">
-                <a:solidFill>
-                  <a:srgbClr val="FFFFFF"/>
-                </a:solidFill>
-              </a14:hiddenFill>
-            </a:ext>
-          </a:extLst>
-        </p:spPr>
-      </p:pic>
-    </p:spTree>
-    <p:extLst>
-      <p:ext uri="{BB962C8B-B14F-4D97-AF65-F5344CB8AC3E}">
-        <p14:creationId xmlns:p14="http://schemas.microsoft.com/office/powerpoint/2010/main" val="767357113"/>
       </p:ext>
     </p:extLst>
   </p:cSld>

</xml_diff>